<commit_message>
Update figure 1 and figure 2
</commit_message>
<xml_diff>
--- a/Figures/spliceNN_figure.pptx
+++ b/Figures/spliceNN_figure.pptx
@@ -39420,6 +39420,132 @@
       </p:grpSpPr>
       <p:sp>
         <p:nvSpPr>
+          <p:cNvPr id="268" name="Freeform 267">
+            <a:extLst>
+              <a:ext uri="{FF2B5EF4-FFF2-40B4-BE49-F238E27FC236}">
+                <a16:creationId xmlns:a16="http://schemas.microsoft.com/office/drawing/2014/main" id="{685897E7-797D-07B9-02FB-22D1010A4253}"/>
+              </a:ext>
+            </a:extLst>
+          </p:cNvPr>
+          <p:cNvSpPr/>
+          <p:nvPr/>
+        </p:nvSpPr>
+        <p:spPr>
+          <a:xfrm>
+            <a:off x="17356131" y="2015766"/>
+            <a:ext cx="1297652" cy="6166843"/>
+          </a:xfrm>
+          <a:custGeom>
+            <a:avLst/>
+            <a:gdLst>
+              <a:gd name="connsiteX0" fmla="*/ 1297652 w 1297652"/>
+              <a:gd name="connsiteY0" fmla="*/ 0 h 6166843"/>
+              <a:gd name="connsiteX1" fmla="*/ 1297652 w 1297652"/>
+              <a:gd name="connsiteY1" fmla="*/ 6166843 h 6166843"/>
+              <a:gd name="connsiteX2" fmla="*/ 1290442 w 1297652"/>
+              <a:gd name="connsiteY2" fmla="*/ 6163668 h 6166843"/>
+              <a:gd name="connsiteX3" fmla="*/ 0 w 1297652"/>
+              <a:gd name="connsiteY3" fmla="*/ 3751322 h 6166843"/>
+              <a:gd name="connsiteX4" fmla="*/ 0 w 1297652"/>
+              <a:gd name="connsiteY4" fmla="*/ 571550 h 6166843"/>
+              <a:gd name="connsiteX5" fmla="*/ 1297652 w 1297652"/>
+              <a:gd name="connsiteY5" fmla="*/ 0 h 6166843"/>
+            </a:gdLst>
+            <a:ahLst/>
+            <a:cxnLst>
+              <a:cxn ang="0">
+                <a:pos x="connsiteX0" y="connsiteY0"/>
+              </a:cxn>
+              <a:cxn ang="0">
+                <a:pos x="connsiteX1" y="connsiteY1"/>
+              </a:cxn>
+              <a:cxn ang="0">
+                <a:pos x="connsiteX2" y="connsiteY2"/>
+              </a:cxn>
+              <a:cxn ang="0">
+                <a:pos x="connsiteX3" y="connsiteY3"/>
+              </a:cxn>
+              <a:cxn ang="0">
+                <a:pos x="connsiteX4" y="connsiteY4"/>
+              </a:cxn>
+              <a:cxn ang="0">
+                <a:pos x="connsiteX5" y="connsiteY5"/>
+              </a:cxn>
+            </a:cxnLst>
+            <a:rect l="l" t="t" r="r" b="b"/>
+            <a:pathLst>
+              <a:path w="1297652" h="6166843">
+                <a:moveTo>
+                  <a:pt x="1297652" y="0"/>
+                </a:moveTo>
+                <a:lnTo>
+                  <a:pt x="1297652" y="6166843"/>
+                </a:lnTo>
+                <a:lnTo>
+                  <a:pt x="1290442" y="6163668"/>
+                </a:lnTo>
+                <a:lnTo>
+                  <a:pt x="0" y="3751322"/>
+                </a:lnTo>
+                <a:lnTo>
+                  <a:pt x="0" y="571550"/>
+                </a:lnTo>
+                <a:lnTo>
+                  <a:pt x="1297652" y="0"/>
+                </a:lnTo>
+                <a:close/>
+              </a:path>
+            </a:pathLst>
+          </a:custGeom>
+          <a:gradFill flip="none" rotWithShape="1">
+            <a:gsLst>
+              <a:gs pos="0">
+                <a:schemeClr val="bg1">
+                  <a:lumMod val="95000"/>
+                </a:schemeClr>
+              </a:gs>
+              <a:gs pos="100000">
+                <a:schemeClr val="bg1">
+                  <a:lumMod val="75000"/>
+                </a:schemeClr>
+              </a:gs>
+            </a:gsLst>
+            <a:lin ang="0" scaled="1"/>
+            <a:tileRect/>
+          </a:gradFill>
+          <a:ln>
+            <a:noFill/>
+          </a:ln>
+        </p:spPr>
+        <p:style>
+          <a:lnRef idx="2">
+            <a:schemeClr val="accent1">
+              <a:shade val="50000"/>
+            </a:schemeClr>
+          </a:lnRef>
+          <a:fillRef idx="1">
+            <a:schemeClr val="accent1"/>
+          </a:fillRef>
+          <a:effectRef idx="0">
+            <a:schemeClr val="accent1"/>
+          </a:effectRef>
+          <a:fontRef idx="minor">
+            <a:schemeClr val="lt1"/>
+          </a:fontRef>
+        </p:style>
+        <p:txBody>
+          <a:bodyPr wrap="square" rtlCol="0" anchor="ctr">
+            <a:noAutofit/>
+          </a:bodyPr>
+          <a:lstStyle/>
+          <a:p>
+            <a:pPr algn="ctr"/>
+            <a:endParaRPr lang="en-US" dirty="0"/>
+          </a:p>
+        </p:txBody>
+      </p:sp>
+      <p:sp>
+        <p:nvSpPr>
           <p:cNvPr id="4" name="Rectangle 3">
             <a:extLst>
               <a:ext uri="{FF2B5EF4-FFF2-40B4-BE49-F238E27FC236}">
@@ -41969,112 +42095,126 @@
       </p:sp>
       <p:sp>
         <p:nvSpPr>
-          <p:cNvPr id="3" name="Rectangle 2">
-            <a:extLst>
-              <a:ext uri="{FF2B5EF4-FFF2-40B4-BE49-F238E27FC236}">
-                <a16:creationId xmlns:a16="http://schemas.microsoft.com/office/drawing/2014/main" id="{B361E447-D40B-C0BD-DA09-97D4C59BD594}"/>
-              </a:ext>
-            </a:extLst>
-          </p:cNvPr>
-          <p:cNvSpPr/>
+          <p:cNvPr id="63" name="Google Shape;75;p19">
+            <a:extLst>
+              <a:ext uri="{FF2B5EF4-FFF2-40B4-BE49-F238E27FC236}">
+                <a16:creationId xmlns:a16="http://schemas.microsoft.com/office/drawing/2014/main" id="{322994DD-AC60-02E3-8747-E72D09AB4EDD}"/>
+              </a:ext>
+            </a:extLst>
+          </p:cNvPr>
+          <p:cNvSpPr txBox="1"/>
           <p:nvPr/>
         </p:nvSpPr>
         <p:spPr>
           <a:xfrm>
-            <a:off x="6949852" y="-3579277"/>
-            <a:ext cx="4355706" cy="451337"/>
+            <a:off x="23487708" y="1504228"/>
+            <a:ext cx="6815904" cy="400069"/>
           </a:xfrm>
           <a:prstGeom prst="rect">
             <a:avLst/>
           </a:prstGeom>
-        </p:spPr>
-        <p:style>
-          <a:lnRef idx="2">
-            <a:schemeClr val="accent1">
-              <a:shade val="50000"/>
-            </a:schemeClr>
-          </a:lnRef>
-          <a:fillRef idx="1">
-            <a:schemeClr val="accent1"/>
-          </a:fillRef>
-          <a:effectRef idx="0">
-            <a:schemeClr val="accent1"/>
-          </a:effectRef>
-          <a:fontRef idx="minor">
-            <a:schemeClr val="lt1"/>
-          </a:fontRef>
-        </p:style>
+          <a:noFill/>
+          <a:ln>
+            <a:noFill/>
+          </a:ln>
+        </p:spPr>
         <p:txBody>
-          <a:bodyPr rtlCol="0" anchor="ctr"/>
+          <a:bodyPr spcFirstLastPara="1" wrap="square" lIns="91425" tIns="45700" rIns="91425" bIns="45700" anchor="t" anchorCtr="0">
+            <a:spAutoFit/>
+          </a:bodyPr>
           <a:lstStyle/>
           <a:p>
             <a:pPr algn="ctr"/>
-            <a:endParaRPr lang="en-US"/>
+            <a:r>
+              <a:rPr lang="en-US" sz="2000" i="0" u="none" strike="noStrike" cap="none" dirty="0">
+                <a:solidFill>
+                  <a:srgbClr val="000000"/>
+                </a:solidFill>
+                <a:latin typeface="Arial"/>
+                <a:ea typeface="Arial"/>
+                <a:cs typeface="Arial"/>
+                <a:sym typeface="Arial"/>
+              </a:rPr>
+              <a:t>Input sequence </a:t>
+            </a:r>
+            <a:r>
+              <a:rPr lang="en-US" sz="2000" i="0" u="none" strike="noStrike" cap="none" dirty="0" err="1">
+                <a:solidFill>
+                  <a:srgbClr val="000000"/>
+                </a:solidFill>
+                <a:latin typeface="Arial"/>
+                <a:ea typeface="Arial"/>
+                <a:cs typeface="Arial"/>
+                <a:sym typeface="Arial"/>
+              </a:rPr>
+              <a:t>len</a:t>
+            </a:r>
+            <a:r>
+              <a:rPr lang="en-US" sz="2000" i="0" u="none" strike="noStrike" cap="none" dirty="0">
+                <a:solidFill>
+                  <a:srgbClr val="000000"/>
+                </a:solidFill>
+                <a:latin typeface="Arial"/>
+                <a:ea typeface="Arial"/>
+                <a:cs typeface="Arial"/>
+                <a:sym typeface="Arial"/>
+              </a:rPr>
+              <a:t>: </a:t>
+            </a:r>
+            <a:r>
+              <a:rPr lang="en-US" sz="2000" b="1" i="0" strike="noStrike" cap="none" dirty="0">
+                <a:solidFill>
+                  <a:srgbClr val="000000"/>
+                </a:solidFill>
+                <a:latin typeface="Arial"/>
+                <a:ea typeface="Arial"/>
+                <a:cs typeface="Arial"/>
+                <a:sym typeface="Arial"/>
+              </a:rPr>
+              <a:t>800bp</a:t>
+            </a:r>
+            <a:r>
+              <a:rPr lang="en-US" sz="2000" b="1" i="0" strike="noStrike" cap="none" dirty="0">
+                <a:latin typeface="Arial"/>
+                <a:ea typeface="Arial"/>
+                <a:cs typeface="Arial"/>
+                <a:sym typeface="Arial"/>
+              </a:rPr>
+              <a:t> (</a:t>
+            </a:r>
+            <a:r>
+              <a:rPr lang="en-US" sz="2000" dirty="0"/>
+              <a:t>Donor: 400bp + Acceptor: 400bp</a:t>
+            </a:r>
+            <a:r>
+              <a:rPr lang="en-US" sz="2000" b="1" i="0" strike="noStrike" cap="none" dirty="0">
+                <a:latin typeface="Arial"/>
+                <a:ea typeface="Arial"/>
+                <a:cs typeface="Arial"/>
+                <a:sym typeface="Arial"/>
+              </a:rPr>
+              <a:t>)</a:t>
+            </a:r>
+            <a:endParaRPr sz="2000" dirty="0"/>
           </a:p>
         </p:txBody>
       </p:sp>
       <p:sp>
         <p:nvSpPr>
-          <p:cNvPr id="62" name="Rectangle 61">
-            <a:extLst>
-              <a:ext uri="{FF2B5EF4-FFF2-40B4-BE49-F238E27FC236}">
-                <a16:creationId xmlns:a16="http://schemas.microsoft.com/office/drawing/2014/main" id="{1EFA4FC2-A59F-1759-FB1F-C117C4EDF0CF}"/>
-              </a:ext>
-            </a:extLst>
-          </p:cNvPr>
-          <p:cNvSpPr/>
+          <p:cNvPr id="64" name="Google Shape;75;p19">
+            <a:extLst>
+              <a:ext uri="{FF2B5EF4-FFF2-40B4-BE49-F238E27FC236}">
+                <a16:creationId xmlns:a16="http://schemas.microsoft.com/office/drawing/2014/main" id="{082BCA82-4AA0-945B-60B3-962223B17326}"/>
+              </a:ext>
+            </a:extLst>
+          </p:cNvPr>
+          <p:cNvSpPr txBox="1"/>
           <p:nvPr/>
         </p:nvSpPr>
         <p:spPr>
           <a:xfrm>
-            <a:off x="11305558" y="-3577483"/>
-            <a:ext cx="4461647" cy="450833"/>
-          </a:xfrm>
-          <a:prstGeom prst="rect">
-            <a:avLst/>
-          </a:prstGeom>
-        </p:spPr>
-        <p:style>
-          <a:lnRef idx="2">
-            <a:schemeClr val="accent1">
-              <a:shade val="50000"/>
-            </a:schemeClr>
-          </a:lnRef>
-          <a:fillRef idx="1">
-            <a:schemeClr val="accent1"/>
-          </a:fillRef>
-          <a:effectRef idx="0">
-            <a:schemeClr val="accent1"/>
-          </a:effectRef>
-          <a:fontRef idx="minor">
-            <a:schemeClr val="lt1"/>
-          </a:fontRef>
-        </p:style>
-        <p:txBody>
-          <a:bodyPr rtlCol="0" anchor="ctr"/>
-          <a:lstStyle/>
-          <a:p>
-            <a:pPr algn="ctr"/>
-            <a:endParaRPr lang="en-US"/>
-          </a:p>
-        </p:txBody>
-      </p:sp>
-      <p:sp>
-        <p:nvSpPr>
-          <p:cNvPr id="63" name="Google Shape;75;p19">
-            <a:extLst>
-              <a:ext uri="{FF2B5EF4-FFF2-40B4-BE49-F238E27FC236}">
-                <a16:creationId xmlns:a16="http://schemas.microsoft.com/office/drawing/2014/main" id="{322994DD-AC60-02E3-8747-E72D09AB4EDD}"/>
-              </a:ext>
-            </a:extLst>
-          </p:cNvPr>
-          <p:cNvSpPr txBox="1"/>
-          <p:nvPr/>
-        </p:nvSpPr>
-        <p:spPr>
-          <a:xfrm>
-            <a:off x="10630931" y="-4435320"/>
-            <a:ext cx="5581147" cy="338514"/>
+            <a:off x="18616683" y="1953517"/>
+            <a:ext cx="990296" cy="523180"/>
           </a:xfrm>
           <a:prstGeom prst="rect">
             <a:avLst/>
@@ -42103,75 +42243,19 @@
               <a:buNone/>
             </a:pPr>
             <a:r>
-              <a:rPr lang="en-US" sz="1600" i="0" u="none" strike="noStrike" cap="none" dirty="0">
-                <a:solidFill>
-                  <a:srgbClr val="000000"/>
-                </a:solidFill>
-                <a:latin typeface="Arial"/>
-                <a:ea typeface="Arial"/>
-                <a:cs typeface="Arial"/>
-                <a:sym typeface="Arial"/>
-              </a:rPr>
-              <a:t>Input sequence (</a:t>
+              <a:rPr lang="en-US" sz="2800" b="1" dirty="0"/>
+              <a:t>0</a:t>
             </a:r>
-            <a:r>
-              <a:rPr lang="en-US" sz="1600" i="0" u="none" strike="noStrike" cap="none" dirty="0" err="1">
-                <a:solidFill>
-                  <a:srgbClr val="000000"/>
-                </a:solidFill>
-                <a:latin typeface="Arial"/>
-                <a:ea typeface="Arial"/>
-                <a:cs typeface="Arial"/>
-                <a:sym typeface="Arial"/>
-              </a:rPr>
-              <a:t>len</a:t>
-            </a:r>
-            <a:r>
-              <a:rPr lang="en-US" sz="1600" i="0" u="none" strike="noStrike" cap="none" dirty="0">
-                <a:solidFill>
-                  <a:srgbClr val="000000"/>
-                </a:solidFill>
-                <a:latin typeface="Arial"/>
-                <a:ea typeface="Arial"/>
-                <a:cs typeface="Arial"/>
-                <a:sym typeface="Arial"/>
-              </a:rPr>
-              <a:t>: </a:t>
-            </a:r>
-            <a:r>
-              <a:rPr lang="en-US" sz="1600" b="1" i="0" u="sng" strike="noStrike" cap="none" dirty="0">
-                <a:solidFill>
-                  <a:srgbClr val="000000"/>
-                </a:solidFill>
-                <a:latin typeface="Arial"/>
-                <a:ea typeface="Arial"/>
-                <a:cs typeface="Arial"/>
-                <a:sym typeface="Arial"/>
-              </a:rPr>
-              <a:t>800</a:t>
-            </a:r>
-            <a:r>
-              <a:rPr lang="en-US" sz="1600" i="0" u="none" strike="noStrike" cap="none" dirty="0">
-                <a:solidFill>
-                  <a:srgbClr val="000000"/>
-                </a:solidFill>
-                <a:latin typeface="Arial"/>
-                <a:ea typeface="Arial"/>
-                <a:cs typeface="Arial"/>
-                <a:sym typeface="Arial"/>
-              </a:rPr>
-              <a:t>;                        +                          )</a:t>
-            </a:r>
-            <a:endParaRPr sz="1600" dirty="0"/>
+            <a:endParaRPr sz="2800" b="1" dirty="0"/>
           </a:p>
         </p:txBody>
       </p:sp>
       <p:sp>
         <p:nvSpPr>
-          <p:cNvPr id="64" name="Google Shape;75;p19">
-            <a:extLst>
-              <a:ext uri="{FF2B5EF4-FFF2-40B4-BE49-F238E27FC236}">
-                <a16:creationId xmlns:a16="http://schemas.microsoft.com/office/drawing/2014/main" id="{082BCA82-4AA0-945B-60B3-962223B17326}"/>
+          <p:cNvPr id="65" name="Google Shape;75;p19">
+            <a:extLst>
+              <a:ext uri="{FF2B5EF4-FFF2-40B4-BE49-F238E27FC236}">
+                <a16:creationId xmlns:a16="http://schemas.microsoft.com/office/drawing/2014/main" id="{BCE67514-4E2D-BA8C-FCB7-F6F406F8B297}"/>
               </a:ext>
             </a:extLst>
           </p:cNvPr>
@@ -42180,8 +42264,8 @@
         </p:nvSpPr>
         <p:spPr>
           <a:xfrm>
-            <a:off x="6695481" y="-4000390"/>
-            <a:ext cx="990296" cy="461624"/>
+            <a:off x="21527930" y="1957500"/>
+            <a:ext cx="990296" cy="523180"/>
           </a:xfrm>
           <a:prstGeom prst="rect">
             <a:avLst/>
@@ -42210,19 +42294,19 @@
               <a:buNone/>
             </a:pPr>
             <a:r>
-              <a:rPr lang="en-US" sz="2400" dirty="0"/>
-              <a:t>0</a:t>
+              <a:rPr lang="en-US" sz="2800" b="1" dirty="0"/>
+              <a:t>200</a:t>
             </a:r>
-            <a:endParaRPr sz="2400" dirty="0"/>
+            <a:endParaRPr sz="2800" b="1" dirty="0"/>
           </a:p>
         </p:txBody>
       </p:sp>
       <p:sp>
         <p:nvSpPr>
-          <p:cNvPr id="65" name="Google Shape;75;p19">
-            <a:extLst>
-              <a:ext uri="{FF2B5EF4-FFF2-40B4-BE49-F238E27FC236}">
-                <a16:creationId xmlns:a16="http://schemas.microsoft.com/office/drawing/2014/main" id="{BCE67514-4E2D-BA8C-FCB7-F6F406F8B297}"/>
+          <p:cNvPr id="66" name="Google Shape;75;p19">
+            <a:extLst>
+              <a:ext uri="{FF2B5EF4-FFF2-40B4-BE49-F238E27FC236}">
+                <a16:creationId xmlns:a16="http://schemas.microsoft.com/office/drawing/2014/main" id="{3E8AC305-C07D-18CB-2D3B-CF058002E131}"/>
               </a:ext>
             </a:extLst>
           </p:cNvPr>
@@ -42231,8 +42315,8 @@
         </p:nvSpPr>
         <p:spPr>
           <a:xfrm>
-            <a:off x="8913866" y="-3984278"/>
-            <a:ext cx="990296" cy="461624"/>
+            <a:off x="26572727" y="1953517"/>
+            <a:ext cx="990296" cy="523180"/>
           </a:xfrm>
           <a:prstGeom prst="rect">
             <a:avLst/>
@@ -42261,19 +42345,19 @@
               <a:buNone/>
             </a:pPr>
             <a:r>
-              <a:rPr lang="en-US" sz="2400" dirty="0"/>
-              <a:t>200</a:t>
+              <a:rPr lang="en-US" sz="2800" b="1" dirty="0"/>
+              <a:t>600</a:t>
             </a:r>
-            <a:endParaRPr sz="2400" dirty="0"/>
+            <a:endParaRPr sz="2800" b="1" dirty="0"/>
           </a:p>
         </p:txBody>
       </p:sp>
       <p:sp>
         <p:nvSpPr>
-          <p:cNvPr id="66" name="Google Shape;75;p19">
-            <a:extLst>
-              <a:ext uri="{FF2B5EF4-FFF2-40B4-BE49-F238E27FC236}">
-                <a16:creationId xmlns:a16="http://schemas.microsoft.com/office/drawing/2014/main" id="{3E8AC305-C07D-18CB-2D3B-CF058002E131}"/>
+          <p:cNvPr id="67" name="Google Shape;75;p19">
+            <a:extLst>
+              <a:ext uri="{FF2B5EF4-FFF2-40B4-BE49-F238E27FC236}">
+                <a16:creationId xmlns:a16="http://schemas.microsoft.com/office/drawing/2014/main" id="{CDEB1E66-0A5C-4B0D-EE66-380CF59CDBC6}"/>
               </a:ext>
             </a:extLst>
           </p:cNvPr>
@@ -42282,8 +42366,8 @@
         </p:nvSpPr>
         <p:spPr>
           <a:xfrm>
-            <a:off x="12804439" y="-4000390"/>
-            <a:ext cx="990296" cy="461624"/>
+            <a:off x="29513013" y="1960607"/>
+            <a:ext cx="990296" cy="523180"/>
           </a:xfrm>
           <a:prstGeom prst="rect">
             <a:avLst/>
@@ -42312,61 +42396,10 @@
               <a:buNone/>
             </a:pPr>
             <a:r>
-              <a:rPr lang="en-US" sz="2400" dirty="0"/>
-              <a:t>600</a:t>
-            </a:r>
-            <a:endParaRPr sz="2400" dirty="0"/>
-          </a:p>
-        </p:txBody>
-      </p:sp>
-      <p:sp>
-        <p:nvSpPr>
-          <p:cNvPr id="67" name="Google Shape;75;p19">
-            <a:extLst>
-              <a:ext uri="{FF2B5EF4-FFF2-40B4-BE49-F238E27FC236}">
-                <a16:creationId xmlns:a16="http://schemas.microsoft.com/office/drawing/2014/main" id="{CDEB1E66-0A5C-4B0D-EE66-380CF59CDBC6}"/>
-              </a:ext>
-            </a:extLst>
-          </p:cNvPr>
-          <p:cNvSpPr txBox="1"/>
-          <p:nvPr/>
-        </p:nvSpPr>
-        <p:spPr>
-          <a:xfrm>
-            <a:off x="15031973" y="-3967857"/>
-            <a:ext cx="990296" cy="461624"/>
-          </a:xfrm>
-          <a:prstGeom prst="rect">
-            <a:avLst/>
-          </a:prstGeom>
-          <a:noFill/>
-          <a:ln>
-            <a:noFill/>
-          </a:ln>
-        </p:spPr>
-        <p:txBody>
-          <a:bodyPr spcFirstLastPara="1" wrap="square" lIns="91425" tIns="45700" rIns="91425" bIns="45700" anchor="t" anchorCtr="0">
-            <a:spAutoFit/>
-          </a:bodyPr>
-          <a:lstStyle/>
-          <a:p>
-            <a:pPr marL="0" marR="0" lvl="0" indent="0" algn="ctr" rtl="0">
-              <a:lnSpc>
-                <a:spcPct val="100000"/>
-              </a:lnSpc>
-              <a:spcBef>
-                <a:spcPts val="0"/>
-              </a:spcBef>
-              <a:spcAft>
-                <a:spcPts val="0"/>
-              </a:spcAft>
-              <a:buNone/>
-            </a:pPr>
-            <a:r>
-              <a:rPr lang="en-US" sz="2400" dirty="0"/>
+              <a:rPr lang="en-US" sz="2800" b="1" dirty="0"/>
               <a:t>799</a:t>
             </a:r>
-            <a:endParaRPr sz="2400" dirty="0"/>
+            <a:endParaRPr sz="2800" b="1" dirty="0"/>
           </a:p>
         </p:txBody>
       </p:sp>
@@ -42384,8 +42417,8 @@
         </p:nvSpPr>
         <p:spPr>
           <a:xfrm>
-            <a:off x="11191501" y="-3068541"/>
-            <a:ext cx="319476" cy="236509"/>
+            <a:off x="24298128" y="3183368"/>
+            <a:ext cx="493763" cy="326554"/>
           </a:xfrm>
           <a:prstGeom prst="downArrow">
             <a:avLst>
@@ -42450,10 +42483,10 @@
         </p:nvGrpSpPr>
         <p:grpSpPr>
           <a:xfrm>
-            <a:off x="18640318" y="1761001"/>
-            <a:ext cx="11518059" cy="1306321"/>
-            <a:chOff x="697431" y="2576465"/>
-            <a:chExt cx="10797134" cy="1224558"/>
+            <a:off x="18785555" y="1697830"/>
+            <a:ext cx="11518058" cy="1369492"/>
+            <a:chOff x="697432" y="2517248"/>
+            <a:chExt cx="10797133" cy="1283775"/>
           </a:xfrm>
         </p:grpSpPr>
         <p:sp>
@@ -42733,13 +42766,13 @@
           </p:nvSpPr>
           <p:spPr>
             <a:xfrm rot="5400000">
-              <a:off x="5819447" y="-2545551"/>
+              <a:off x="5819448" y="-2604768"/>
               <a:ext cx="553100" cy="10797132"/>
             </a:xfrm>
             <a:prstGeom prst="leftBrace">
               <a:avLst>
                 <a:gd name="adj1" fmla="val 8333"/>
-                <a:gd name="adj2" fmla="val 50000"/>
+                <a:gd name="adj2" fmla="val 62437"/>
               </a:avLst>
             </a:prstGeom>
             <a:noFill/>
@@ -42804,7 +42837,10 @@
               <a:avLst/>
             </a:prstGeom>
             <a:solidFill>
-              <a:schemeClr val="accent1"/>
+              <a:schemeClr val="tx2">
+                <a:lumMod val="40000"/>
+                <a:lumOff val="60000"/>
+              </a:schemeClr>
             </a:solidFill>
             <a:ln w="25400" cap="flat" cmpd="sng">
               <a:solidFill>
@@ -42834,19 +42870,7 @@
                 </a:spcAft>
                 <a:buNone/>
               </a:pPr>
-              <a:r>
-                <a:rPr lang="en-US" sz="2400" b="0" i="0" u="none" strike="noStrike" cap="none">
-                  <a:solidFill>
-                    <a:schemeClr val="lt1"/>
-                  </a:solidFill>
-                  <a:latin typeface="Arial"/>
-                  <a:ea typeface="Arial"/>
-                  <a:cs typeface="Arial"/>
-                  <a:sym typeface="Arial"/>
-                </a:rPr>
-                <a:t>A</a:t>
-              </a:r>
-              <a:endParaRPr sz="3200"/>
+              <a:endParaRPr sz="3200" dirty="0"/>
             </a:p>
           </p:txBody>
         </p:sp>
@@ -43138,7 +43162,10 @@
               <a:avLst/>
             </a:prstGeom>
             <a:solidFill>
-              <a:schemeClr val="accent1"/>
+              <a:schemeClr val="tx2">
+                <a:lumMod val="40000"/>
+                <a:lumOff val="60000"/>
+              </a:schemeClr>
             </a:solidFill>
             <a:ln w="25400" cap="flat" cmpd="sng">
               <a:solidFill>
@@ -43168,18 +43195,6 @@
                 </a:spcAft>
                 <a:buNone/>
               </a:pPr>
-              <a:r>
-                <a:rPr lang="en-US" sz="2400" b="0" i="0" u="none" strike="noStrike" cap="none" dirty="0">
-                  <a:solidFill>
-                    <a:schemeClr val="lt1"/>
-                  </a:solidFill>
-                  <a:latin typeface="Arial"/>
-                  <a:ea typeface="Arial"/>
-                  <a:cs typeface="Arial"/>
-                  <a:sym typeface="Arial"/>
-                </a:rPr>
-                <a:t>C</a:t>
-              </a:r>
               <a:endParaRPr sz="3200" dirty="0"/>
             </a:p>
           </p:txBody>
@@ -43783,76 +43798,6 @@
           </p:txBody>
         </p:sp>
       </p:grpSp>
-      <p:sp>
-        <p:nvSpPr>
-          <p:cNvPr id="90" name="TextBox 89">
-            <a:extLst>
-              <a:ext uri="{FF2B5EF4-FFF2-40B4-BE49-F238E27FC236}">
-                <a16:creationId xmlns:a16="http://schemas.microsoft.com/office/drawing/2014/main" id="{81467BFB-AB0E-0D30-231E-7F5C3C20BFAD}"/>
-              </a:ext>
-            </a:extLst>
-          </p:cNvPr>
-          <p:cNvSpPr txBox="1"/>
-          <p:nvPr/>
-        </p:nvSpPr>
-        <p:spPr>
-          <a:xfrm>
-            <a:off x="10631067" y="-3660670"/>
-            <a:ext cx="404278" cy="461665"/>
-          </a:xfrm>
-          <a:prstGeom prst="rect">
-            <a:avLst/>
-          </a:prstGeom>
-          <a:noFill/>
-        </p:spPr>
-        <p:txBody>
-          <a:bodyPr wrap="none" rtlCol="0">
-            <a:spAutoFit/>
-          </a:bodyPr>
-          <a:lstStyle/>
-          <a:p>
-            <a:r>
-              <a:rPr lang="en-US" sz="2400" b="1" dirty="0"/>
-              <a:t>…</a:t>
-            </a:r>
-          </a:p>
-        </p:txBody>
-      </p:sp>
-      <p:sp>
-        <p:nvSpPr>
-          <p:cNvPr id="91" name="TextBox 90">
-            <a:extLst>
-              <a:ext uri="{FF2B5EF4-FFF2-40B4-BE49-F238E27FC236}">
-                <a16:creationId xmlns:a16="http://schemas.microsoft.com/office/drawing/2014/main" id="{8A0AC553-5756-C712-680B-669678484248}"/>
-              </a:ext>
-            </a:extLst>
-          </p:cNvPr>
-          <p:cNvSpPr txBox="1"/>
-          <p:nvPr/>
-        </p:nvSpPr>
-        <p:spPr>
-          <a:xfrm>
-            <a:off x="11660204" y="-3650459"/>
-            <a:ext cx="404278" cy="461665"/>
-          </a:xfrm>
-          <a:prstGeom prst="rect">
-            <a:avLst/>
-          </a:prstGeom>
-          <a:noFill/>
-        </p:spPr>
-        <p:txBody>
-          <a:bodyPr wrap="none" rtlCol="0">
-            <a:spAutoFit/>
-          </a:bodyPr>
-          <a:lstStyle/>
-          <a:p>
-            <a:r>
-              <a:rPr lang="en-US" sz="2400" b="1" dirty="0"/>
-              <a:t>…</a:t>
-            </a:r>
-          </a:p>
-        </p:txBody>
-      </p:sp>
       <p:grpSp>
         <p:nvGrpSpPr>
           <p:cNvPr id="254" name="Group 253">
@@ -43867,7 +43812,7 @@
         </p:nvGrpSpPr>
         <p:grpSpPr>
           <a:xfrm>
-            <a:off x="18642317" y="3418240"/>
+            <a:off x="18787553" y="3418240"/>
             <a:ext cx="11518053" cy="2588166"/>
             <a:chOff x="19983587" y="3211877"/>
             <a:chExt cx="12655515" cy="2843760"/>
@@ -44205,7 +44150,9 @@
               <a:avLst/>
             </a:prstGeom>
             <a:solidFill>
-              <a:schemeClr val="accent1"/>
+              <a:schemeClr val="bg2">
+                <a:lumMod val="90000"/>
+              </a:schemeClr>
             </a:solidFill>
             <a:ln w="50800">
               <a:solidFill>
@@ -44247,17 +44194,6 @@
                 </a:spcAft>
                 <a:buNone/>
               </a:pPr>
-              <a:r>
-                <a:rPr lang="en-US" sz="2400" b="1" dirty="0">
-                  <a:solidFill>
-                    <a:schemeClr val="lt1"/>
-                  </a:solidFill>
-                  <a:latin typeface="Arial"/>
-                  <a:cs typeface="Arial"/>
-                  <a:sym typeface="Arial"/>
-                </a:rPr>
-                <a:t>0</a:t>
-              </a:r>
               <a:endParaRPr sz="3200" b="1" dirty="0"/>
             </a:p>
           </p:txBody>
@@ -44595,7 +44531,9 @@
               <a:avLst/>
             </a:prstGeom>
             <a:solidFill>
-              <a:schemeClr val="accent1"/>
+              <a:schemeClr val="bg2">
+                <a:lumMod val="90000"/>
+              </a:schemeClr>
             </a:solidFill>
             <a:ln w="50800">
               <a:solidFill>
@@ -44637,17 +44575,6 @@
                 </a:spcAft>
                 <a:buNone/>
               </a:pPr>
-              <a:r>
-                <a:rPr lang="en-US" sz="2400" b="1" dirty="0">
-                  <a:solidFill>
-                    <a:schemeClr val="lt1"/>
-                  </a:solidFill>
-                  <a:latin typeface="Arial"/>
-                  <a:cs typeface="Arial"/>
-                  <a:sym typeface="Arial"/>
-                </a:rPr>
-                <a:t>0</a:t>
-              </a:r>
               <a:endParaRPr sz="3200" b="1" dirty="0"/>
             </a:p>
           </p:txBody>
@@ -45607,7 +45534,9 @@
               <a:avLst/>
             </a:prstGeom>
             <a:solidFill>
-              <a:schemeClr val="accent1"/>
+              <a:schemeClr val="bg2">
+                <a:lumMod val="90000"/>
+              </a:schemeClr>
             </a:solidFill>
             <a:ln w="50800">
               <a:solidFill>
@@ -45649,17 +45578,6 @@
                 </a:spcAft>
                 <a:buNone/>
               </a:pPr>
-              <a:r>
-                <a:rPr lang="en-US" sz="2400" b="1" dirty="0">
-                  <a:solidFill>
-                    <a:schemeClr val="lt1"/>
-                  </a:solidFill>
-                  <a:latin typeface="Arial"/>
-                  <a:cs typeface="Arial"/>
-                  <a:sym typeface="Arial"/>
-                </a:rPr>
-                <a:t>0</a:t>
-              </a:r>
               <a:endParaRPr sz="3200" b="1" dirty="0"/>
             </a:p>
           </p:txBody>
@@ -45997,7 +45915,9 @@
               <a:avLst/>
             </a:prstGeom>
             <a:solidFill>
-              <a:schemeClr val="accent1"/>
+              <a:schemeClr val="bg2">
+                <a:lumMod val="90000"/>
+              </a:schemeClr>
             </a:solidFill>
             <a:ln w="50800">
               <a:solidFill>
@@ -46039,17 +45959,6 @@
                 </a:spcAft>
                 <a:buNone/>
               </a:pPr>
-              <a:r>
-                <a:rPr lang="en-US" sz="2400" b="1" dirty="0">
-                  <a:solidFill>
-                    <a:schemeClr val="lt1"/>
-                  </a:solidFill>
-                  <a:latin typeface="Arial"/>
-                  <a:cs typeface="Arial"/>
-                  <a:sym typeface="Arial"/>
-                </a:rPr>
-                <a:t>1</a:t>
-              </a:r>
               <a:endParaRPr sz="3200" b="1" dirty="0"/>
             </a:p>
           </p:txBody>
@@ -47008,7 +46917,9 @@
               <a:avLst/>
             </a:prstGeom>
             <a:solidFill>
-              <a:schemeClr val="accent1"/>
+              <a:schemeClr val="bg2">
+                <a:lumMod val="90000"/>
+              </a:schemeClr>
             </a:solidFill>
             <a:ln w="50800">
               <a:solidFill>
@@ -47050,17 +46961,6 @@
                 </a:spcAft>
                 <a:buNone/>
               </a:pPr>
-              <a:r>
-                <a:rPr lang="en-US" sz="2400" b="1" dirty="0">
-                  <a:solidFill>
-                    <a:schemeClr val="lt1"/>
-                  </a:solidFill>
-                  <a:latin typeface="Arial"/>
-                  <a:cs typeface="Arial"/>
-                  <a:sym typeface="Arial"/>
-                </a:rPr>
-                <a:t>1</a:t>
-              </a:r>
               <a:endParaRPr sz="3200" b="1" dirty="0"/>
             </a:p>
           </p:txBody>
@@ -47398,7 +47298,9 @@
               <a:avLst/>
             </a:prstGeom>
             <a:solidFill>
-              <a:schemeClr val="accent1"/>
+              <a:schemeClr val="bg2">
+                <a:lumMod val="90000"/>
+              </a:schemeClr>
             </a:solidFill>
             <a:ln w="50800">
               <a:solidFill>
@@ -47440,17 +47342,6 @@
                 </a:spcAft>
                 <a:buNone/>
               </a:pPr>
-              <a:r>
-                <a:rPr lang="en-US" sz="2400" b="1" dirty="0">
-                  <a:solidFill>
-                    <a:schemeClr val="lt1"/>
-                  </a:solidFill>
-                  <a:latin typeface="Arial"/>
-                  <a:cs typeface="Arial"/>
-                  <a:sym typeface="Arial"/>
-                </a:rPr>
-                <a:t>0</a:t>
-              </a:r>
               <a:endParaRPr sz="3200" b="1" dirty="0"/>
             </a:p>
           </p:txBody>
@@ -48408,7 +48299,9 @@
               <a:avLst/>
             </a:prstGeom>
             <a:solidFill>
-              <a:schemeClr val="accent1"/>
+              <a:schemeClr val="bg2">
+                <a:lumMod val="90000"/>
+              </a:schemeClr>
             </a:solidFill>
             <a:ln w="50800">
               <a:solidFill>
@@ -48450,17 +48343,6 @@
                 </a:spcAft>
                 <a:buNone/>
               </a:pPr>
-              <a:r>
-                <a:rPr lang="en-US" sz="2400" b="1" dirty="0">
-                  <a:solidFill>
-                    <a:schemeClr val="lt1"/>
-                  </a:solidFill>
-                  <a:latin typeface="Arial"/>
-                  <a:cs typeface="Arial"/>
-                  <a:sym typeface="Arial"/>
-                </a:rPr>
-                <a:t>0</a:t>
-              </a:r>
               <a:endParaRPr sz="3200" b="1" dirty="0"/>
             </a:p>
           </p:txBody>
@@ -48798,7 +48680,9 @@
               <a:avLst/>
             </a:prstGeom>
             <a:solidFill>
-              <a:schemeClr val="accent1"/>
+              <a:schemeClr val="bg2">
+                <a:lumMod val="90000"/>
+              </a:schemeClr>
             </a:solidFill>
             <a:ln w="50800">
               <a:solidFill>
@@ -48840,17 +48724,6 @@
                 </a:spcAft>
                 <a:buNone/>
               </a:pPr>
-              <a:r>
-                <a:rPr lang="en-US" sz="2400" b="1" dirty="0">
-                  <a:solidFill>
-                    <a:schemeClr val="lt1"/>
-                  </a:solidFill>
-                  <a:latin typeface="Arial"/>
-                  <a:cs typeface="Arial"/>
-                  <a:sym typeface="Arial"/>
-                </a:rPr>
-                <a:t>0</a:t>
-              </a:r>
               <a:endParaRPr sz="3200" b="1" dirty="0"/>
             </a:p>
           </p:txBody>
@@ -50269,7 +50142,7 @@
         </p:nvGrpSpPr>
         <p:grpSpPr>
           <a:xfrm>
-            <a:off x="18642317" y="6505755"/>
+            <a:off x="18787553" y="6221222"/>
             <a:ext cx="11518052" cy="1961389"/>
             <a:chOff x="19983587" y="6299392"/>
             <a:chExt cx="12655516" cy="2155086"/>
@@ -50639,9 +50512,8 @@
               <a:avLst/>
             </a:prstGeom>
             <a:solidFill>
-              <a:schemeClr val="accent4">
-                <a:lumMod val="60000"/>
-                <a:lumOff val="40000"/>
+              <a:schemeClr val="bg2">
+                <a:lumMod val="90000"/>
               </a:schemeClr>
             </a:solidFill>
             <a:ln w="50800">
@@ -50686,17 +50558,6 @@
                 </a:spcAft>
                 <a:buNone/>
               </a:pPr>
-              <a:r>
-                <a:rPr lang="en-US" sz="2400" b="1" dirty="0">
-                  <a:solidFill>
-                    <a:schemeClr val="tx1"/>
-                  </a:solidFill>
-                  <a:latin typeface="Arial"/>
-                  <a:cs typeface="Arial"/>
-                  <a:sym typeface="Arial"/>
-                </a:rPr>
-                <a:t>0</a:t>
-              </a:r>
               <a:endParaRPr sz="3200" b="1" dirty="0">
                 <a:solidFill>
                   <a:schemeClr val="tx1"/>
@@ -51074,9 +50935,8 @@
               <a:avLst/>
             </a:prstGeom>
             <a:solidFill>
-              <a:schemeClr val="accent4">
-                <a:lumMod val="60000"/>
-                <a:lumOff val="40000"/>
+              <a:schemeClr val="bg2">
+                <a:lumMod val="90000"/>
               </a:schemeClr>
             </a:solidFill>
             <a:ln w="50800">
@@ -51121,17 +50981,6 @@
                 </a:spcAft>
                 <a:buNone/>
               </a:pPr>
-              <a:r>
-                <a:rPr lang="en-US" sz="2400" b="1" dirty="0">
-                  <a:solidFill>
-                    <a:schemeClr val="tx1"/>
-                  </a:solidFill>
-                  <a:latin typeface="Arial"/>
-                  <a:cs typeface="Arial"/>
-                  <a:sym typeface="Arial"/>
-                </a:rPr>
-                <a:t>0</a:t>
-              </a:r>
               <a:endParaRPr sz="3200" b="1" dirty="0">
                 <a:solidFill>
                   <a:schemeClr val="tx1"/>
@@ -52199,9 +52048,8 @@
               <a:avLst/>
             </a:prstGeom>
             <a:solidFill>
-              <a:schemeClr val="accent4">
-                <a:lumMod val="60000"/>
-                <a:lumOff val="40000"/>
+              <a:schemeClr val="bg2">
+                <a:lumMod val="90000"/>
               </a:schemeClr>
             </a:solidFill>
             <a:ln w="50800">
@@ -52246,17 +52094,6 @@
                 </a:spcAft>
                 <a:buNone/>
               </a:pPr>
-              <a:r>
-                <a:rPr lang="en-US" sz="2400" b="1" dirty="0">
-                  <a:solidFill>
-                    <a:schemeClr val="tx1"/>
-                  </a:solidFill>
-                  <a:latin typeface="Arial"/>
-                  <a:cs typeface="Arial"/>
-                  <a:sym typeface="Arial"/>
-                </a:rPr>
-                <a:t>0</a:t>
-              </a:r>
               <a:endParaRPr sz="3200" b="1" dirty="0">
                 <a:solidFill>
                   <a:schemeClr val="tx1"/>
@@ -52634,9 +52471,8 @@
               <a:avLst/>
             </a:prstGeom>
             <a:solidFill>
-              <a:schemeClr val="accent4">
-                <a:lumMod val="60000"/>
-                <a:lumOff val="40000"/>
+              <a:schemeClr val="bg2">
+                <a:lumMod val="90000"/>
               </a:schemeClr>
             </a:solidFill>
             <a:ln w="50800">
@@ -52681,17 +52517,6 @@
                 </a:spcAft>
                 <a:buNone/>
               </a:pPr>
-              <a:r>
-                <a:rPr lang="en-US" sz="2400" b="1" dirty="0">
-                  <a:solidFill>
-                    <a:schemeClr val="tx1"/>
-                  </a:solidFill>
-                  <a:latin typeface="Arial"/>
-                  <a:cs typeface="Arial"/>
-                  <a:sym typeface="Arial"/>
-                </a:rPr>
-                <a:t>0</a:t>
-              </a:r>
               <a:endParaRPr sz="3200" b="1" dirty="0">
                 <a:solidFill>
                   <a:schemeClr val="tx1"/>
@@ -53463,7 +53288,7 @@
                 </a:spcAft>
                 <a:buNone/>
               </a:pPr>
-              <a:endParaRPr sz="2400" b="1" i="0" u="none" strike="noStrike" cap="none">
+              <a:endParaRPr sz="2400" b="1" i="0" u="none" strike="noStrike" cap="none" dirty="0">
                 <a:solidFill>
                   <a:schemeClr val="tx1"/>
                 </a:solidFill>
@@ -53757,9 +53582,8 @@
               <a:avLst/>
             </a:prstGeom>
             <a:solidFill>
-              <a:schemeClr val="accent4">
-                <a:lumMod val="60000"/>
-                <a:lumOff val="40000"/>
+              <a:schemeClr val="bg2">
+                <a:lumMod val="90000"/>
               </a:schemeClr>
             </a:solidFill>
             <a:ln w="50800">
@@ -53804,17 +53628,6 @@
                 </a:spcAft>
                 <a:buNone/>
               </a:pPr>
-              <a:r>
-                <a:rPr lang="en-US" sz="2400" b="1" dirty="0">
-                  <a:solidFill>
-                    <a:schemeClr val="tx1"/>
-                  </a:solidFill>
-                  <a:latin typeface="Arial"/>
-                  <a:cs typeface="Arial"/>
-                  <a:sym typeface="Arial"/>
-                </a:rPr>
-                <a:t>0</a:t>
-              </a:r>
               <a:endParaRPr sz="3200" b="1" dirty="0">
                 <a:solidFill>
                   <a:schemeClr val="tx1"/>
@@ -54192,9 +54005,8 @@
               <a:avLst/>
             </a:prstGeom>
             <a:solidFill>
-              <a:schemeClr val="accent4">
-                <a:lumMod val="60000"/>
-                <a:lumOff val="40000"/>
+              <a:schemeClr val="bg2">
+                <a:lumMod val="90000"/>
               </a:schemeClr>
             </a:solidFill>
             <a:ln w="50800">
@@ -54239,17 +54051,6 @@
                 </a:spcAft>
                 <a:buNone/>
               </a:pPr>
-              <a:r>
-                <a:rPr lang="en-US" sz="2400" b="1" dirty="0">
-                  <a:solidFill>
-                    <a:schemeClr val="tx1"/>
-                  </a:solidFill>
-                  <a:latin typeface="Arial"/>
-                  <a:cs typeface="Arial"/>
-                  <a:sym typeface="Arial"/>
-                </a:rPr>
-                <a:t>0</a:t>
-              </a:r>
               <a:endParaRPr sz="3200" b="1" dirty="0">
                 <a:solidFill>
                   <a:schemeClr val="tx1"/>
@@ -55563,12 +55364,221 @@
           </p:txBody>
         </p:sp>
       </p:grpSp>
+      <p:cxnSp>
+        <p:nvCxnSpPr>
+          <p:cNvPr id="247" name="Straight Connector 246">
+            <a:extLst>
+              <a:ext uri="{FF2B5EF4-FFF2-40B4-BE49-F238E27FC236}">
+                <a16:creationId xmlns:a16="http://schemas.microsoft.com/office/drawing/2014/main" id="{DE8AA779-66A6-BCF0-C202-1EE9E3E7B83A}"/>
+              </a:ext>
+            </a:extLst>
+          </p:cNvPr>
+          <p:cNvCxnSpPr>
+            <a:cxnSpLocks/>
+          </p:cNvCxnSpPr>
+          <p:nvPr/>
+        </p:nvCxnSpPr>
+        <p:spPr>
+          <a:xfrm>
+            <a:off x="18653788" y="6199884"/>
+            <a:ext cx="11649823" cy="0"/>
+          </a:xfrm>
+          <a:prstGeom prst="line">
+            <a:avLst/>
+          </a:prstGeom>
+          <a:ln w="63500">
+            <a:solidFill>
+              <a:schemeClr val="tx1"/>
+            </a:solidFill>
+            <a:prstDash val="sysDash"/>
+          </a:ln>
+        </p:spPr>
+        <p:style>
+          <a:lnRef idx="1">
+            <a:schemeClr val="accent1"/>
+          </a:lnRef>
+          <a:fillRef idx="0">
+            <a:schemeClr val="accent1"/>
+          </a:fillRef>
+          <a:effectRef idx="0">
+            <a:schemeClr val="accent1"/>
+          </a:effectRef>
+          <a:fontRef idx="minor">
+            <a:schemeClr val="tx1"/>
+          </a:fontRef>
+        </p:style>
+      </p:cxnSp>
+      <p:pic>
+        <p:nvPicPr>
+          <p:cNvPr id="257" name="Picture 256" descr="Chart, bar chart&#10;&#10;Description automatically generated">
+            <a:extLst>
+              <a:ext uri="{FF2B5EF4-FFF2-40B4-BE49-F238E27FC236}">
+                <a16:creationId xmlns:a16="http://schemas.microsoft.com/office/drawing/2014/main" id="{FF6F5887-C857-B1B2-2741-B21880110EF4}"/>
+              </a:ext>
+            </a:extLst>
+          </p:cNvPr>
+          <p:cNvPicPr>
+            <a:picLocks noChangeAspect="1"/>
+          </p:cNvPicPr>
+          <p:nvPr/>
+        </p:nvPicPr>
+        <p:blipFill>
+          <a:blip r:embed="rId2"/>
+          <a:stretch>
+            <a:fillRect/>
+          </a:stretch>
+        </p:blipFill>
+        <p:spPr>
+          <a:xfrm>
+            <a:off x="18325696" y="8688255"/>
+            <a:ext cx="6651202" cy="4988402"/>
+          </a:xfrm>
+          <a:prstGeom prst="rect">
+            <a:avLst/>
+          </a:prstGeom>
+        </p:spPr>
+      </p:pic>
+      <p:pic>
+        <p:nvPicPr>
+          <p:cNvPr id="259" name="Picture 258" descr="Chart, bar chart&#10;&#10;Description automatically generated">
+            <a:extLst>
+              <a:ext uri="{FF2B5EF4-FFF2-40B4-BE49-F238E27FC236}">
+                <a16:creationId xmlns:a16="http://schemas.microsoft.com/office/drawing/2014/main" id="{4259B9FF-B7BF-2EAD-8950-180716A73C37}"/>
+              </a:ext>
+            </a:extLst>
+          </p:cNvPr>
+          <p:cNvPicPr>
+            <a:picLocks noChangeAspect="1"/>
+          </p:cNvPicPr>
+          <p:nvPr/>
+        </p:nvPicPr>
+        <p:blipFill>
+          <a:blip r:embed="rId3"/>
+          <a:stretch>
+            <a:fillRect/>
+          </a:stretch>
+        </p:blipFill>
+        <p:spPr>
+          <a:xfrm>
+            <a:off x="24471839" y="8688253"/>
+            <a:ext cx="6651191" cy="4988393"/>
+          </a:xfrm>
+          <a:prstGeom prst="rect">
+            <a:avLst/>
+          </a:prstGeom>
+        </p:spPr>
+      </p:pic>
       <p:sp>
         <p:nvSpPr>
-          <p:cNvPr id="242" name="Rounded Rectangle 241">
-            <a:extLst>
-              <a:ext uri="{FF2B5EF4-FFF2-40B4-BE49-F238E27FC236}">
-                <a16:creationId xmlns:a16="http://schemas.microsoft.com/office/drawing/2014/main" id="{64F3CBF6-77E9-39C4-7DF3-E9D041AC24A6}"/>
+          <p:cNvPr id="2" name="TextBox 1">
+            <a:extLst>
+              <a:ext uri="{FF2B5EF4-FFF2-40B4-BE49-F238E27FC236}">
+                <a16:creationId xmlns:a16="http://schemas.microsoft.com/office/drawing/2014/main" id="{CEA4F403-E92B-6D77-1930-83E0CDED60E6}"/>
+              </a:ext>
+            </a:extLst>
+          </p:cNvPr>
+          <p:cNvSpPr txBox="1"/>
+          <p:nvPr/>
+        </p:nvSpPr>
+        <p:spPr>
+          <a:xfrm>
+            <a:off x="2446638" y="1171557"/>
+            <a:ext cx="627095" cy="1169551"/>
+          </a:xfrm>
+          <a:prstGeom prst="rect">
+            <a:avLst/>
+          </a:prstGeom>
+          <a:noFill/>
+        </p:spPr>
+        <p:txBody>
+          <a:bodyPr wrap="none" rtlCol="0">
+            <a:spAutoFit/>
+          </a:bodyPr>
+          <a:lstStyle/>
+          <a:p>
+            <a:r>
+              <a:rPr lang="en-US" sz="7000" b="1" dirty="0"/>
+              <a:t>a</a:t>
+            </a:r>
+          </a:p>
+        </p:txBody>
+      </p:sp>
+      <p:sp>
+        <p:nvSpPr>
+          <p:cNvPr id="92" name="TextBox 91">
+            <a:extLst>
+              <a:ext uri="{FF2B5EF4-FFF2-40B4-BE49-F238E27FC236}">
+                <a16:creationId xmlns:a16="http://schemas.microsoft.com/office/drawing/2014/main" id="{7E12F7F9-B854-73BD-85CD-E7E1BDB47ED3}"/>
+              </a:ext>
+            </a:extLst>
+          </p:cNvPr>
+          <p:cNvSpPr txBox="1"/>
+          <p:nvPr/>
+        </p:nvSpPr>
+        <p:spPr>
+          <a:xfrm>
+            <a:off x="17986618" y="1171556"/>
+            <a:ext cx="667170" cy="1169551"/>
+          </a:xfrm>
+          <a:prstGeom prst="rect">
+            <a:avLst/>
+          </a:prstGeom>
+          <a:noFill/>
+        </p:spPr>
+        <p:txBody>
+          <a:bodyPr wrap="none" rtlCol="0">
+            <a:spAutoFit/>
+          </a:bodyPr>
+          <a:lstStyle/>
+          <a:p>
+            <a:r>
+              <a:rPr lang="en-US" sz="7000" b="1" dirty="0"/>
+              <a:t>b</a:t>
+            </a:r>
+          </a:p>
+        </p:txBody>
+      </p:sp>
+      <p:sp>
+        <p:nvSpPr>
+          <p:cNvPr id="177" name="TextBox 176">
+            <a:extLst>
+              <a:ext uri="{FF2B5EF4-FFF2-40B4-BE49-F238E27FC236}">
+                <a16:creationId xmlns:a16="http://schemas.microsoft.com/office/drawing/2014/main" id="{8D17EE7F-CD11-2598-F8C0-C2A93548BCAB}"/>
+              </a:ext>
+            </a:extLst>
+          </p:cNvPr>
+          <p:cNvSpPr txBox="1"/>
+          <p:nvPr/>
+        </p:nvSpPr>
+        <p:spPr>
+          <a:xfrm>
+            <a:off x="17990296" y="8381990"/>
+            <a:ext cx="559769" cy="1169551"/>
+          </a:xfrm>
+          <a:prstGeom prst="rect">
+            <a:avLst/>
+          </a:prstGeom>
+          <a:noFill/>
+        </p:spPr>
+        <p:txBody>
+          <a:bodyPr wrap="none" rtlCol="0">
+            <a:spAutoFit/>
+          </a:bodyPr>
+          <a:lstStyle/>
+          <a:p>
+            <a:r>
+              <a:rPr lang="en-US" sz="7000" b="1" dirty="0"/>
+              <a:t>c</a:t>
+            </a:r>
+          </a:p>
+        </p:txBody>
+      </p:sp>
+      <p:sp>
+        <p:nvSpPr>
+          <p:cNvPr id="256" name="Rounded Rectangle 255">
+            <a:extLst>
+              <a:ext uri="{FF2B5EF4-FFF2-40B4-BE49-F238E27FC236}">
+                <a16:creationId xmlns:a16="http://schemas.microsoft.com/office/drawing/2014/main" id="{9FBC3E35-D04F-DB74-B048-449B0EC8075C}"/>
               </a:ext>
             </a:extLst>
           </p:cNvPr>
@@ -55577,8 +55587,8 @@
         </p:nvSpPr>
         <p:spPr>
           <a:xfrm>
-            <a:off x="21590503" y="2245659"/>
-            <a:ext cx="569537" cy="6360459"/>
+            <a:off x="21735739" y="2421590"/>
+            <a:ext cx="569537" cy="6004316"/>
           </a:xfrm>
           <a:prstGeom prst="roundRect">
             <a:avLst/>
@@ -55617,369 +55627,20 @@
       </p:sp>
       <p:sp>
         <p:nvSpPr>
-          <p:cNvPr id="243" name="TextBox 242">
-            <a:extLst>
-              <a:ext uri="{FF2B5EF4-FFF2-40B4-BE49-F238E27FC236}">
-                <a16:creationId xmlns:a16="http://schemas.microsoft.com/office/drawing/2014/main" id="{46CB603F-C849-CB39-7930-75F0DBAF9201}"/>
-              </a:ext>
-            </a:extLst>
-          </p:cNvPr>
-          <p:cNvSpPr txBox="1"/>
+          <p:cNvPr id="258" name="Rounded Rectangle 257">
+            <a:extLst>
+              <a:ext uri="{FF2B5EF4-FFF2-40B4-BE49-F238E27FC236}">
+                <a16:creationId xmlns:a16="http://schemas.microsoft.com/office/drawing/2014/main" id="{FC80A0CB-D049-B161-64CB-7EA267D21BB3}"/>
+              </a:ext>
+            </a:extLst>
+          </p:cNvPr>
+          <p:cNvSpPr/>
           <p:nvPr/>
         </p:nvSpPr>
         <p:spPr>
           <a:xfrm>
-            <a:off x="16021952" y="-2166984"/>
-            <a:ext cx="1409360" cy="584775"/>
-          </a:xfrm>
-          <a:prstGeom prst="rect">
-            <a:avLst/>
-          </a:prstGeom>
-          <a:noFill/>
-        </p:spPr>
-        <p:txBody>
-          <a:bodyPr wrap="none" rtlCol="0">
-            <a:spAutoFit/>
-          </a:bodyPr>
-          <a:lstStyle/>
-          <a:p>
-            <a:r>
-              <a:rPr lang="en-US" sz="3200" b="1" dirty="0">
-                <a:solidFill>
-                  <a:schemeClr val="accent6"/>
-                </a:solidFill>
-              </a:rPr>
-              <a:t>800 * 4</a:t>
-            </a:r>
-          </a:p>
-        </p:txBody>
-      </p:sp>
-      <p:sp>
-        <p:nvSpPr>
-          <p:cNvPr id="244" name="TextBox 243">
-            <a:extLst>
-              <a:ext uri="{FF2B5EF4-FFF2-40B4-BE49-F238E27FC236}">
-                <a16:creationId xmlns:a16="http://schemas.microsoft.com/office/drawing/2014/main" id="{B14DF257-D13D-1784-6627-A6CFDD01072C}"/>
-              </a:ext>
-            </a:extLst>
-          </p:cNvPr>
-          <p:cNvSpPr txBox="1"/>
-          <p:nvPr/>
-        </p:nvSpPr>
-        <p:spPr>
-          <a:xfrm>
-            <a:off x="16022269" y="53706"/>
-            <a:ext cx="1409360" cy="584775"/>
-          </a:xfrm>
-          <a:prstGeom prst="rect">
-            <a:avLst/>
-          </a:prstGeom>
-          <a:noFill/>
-        </p:spPr>
-        <p:txBody>
-          <a:bodyPr wrap="none" rtlCol="0">
-            <a:spAutoFit/>
-          </a:bodyPr>
-          <a:lstStyle/>
-          <a:p>
-            <a:r>
-              <a:rPr lang="en-US" sz="3200" b="1" dirty="0">
-                <a:solidFill>
-                  <a:schemeClr val="accent2"/>
-                </a:solidFill>
-              </a:rPr>
-              <a:t>800 * 3</a:t>
-            </a:r>
-          </a:p>
-        </p:txBody>
-      </p:sp>
-      <p:sp>
-        <p:nvSpPr>
-          <p:cNvPr id="245" name="TextBox 244">
-            <a:extLst>
-              <a:ext uri="{FF2B5EF4-FFF2-40B4-BE49-F238E27FC236}">
-                <a16:creationId xmlns:a16="http://schemas.microsoft.com/office/drawing/2014/main" id="{84461DFE-22F5-5420-441E-F590CF896D60}"/>
-              </a:ext>
-            </a:extLst>
-          </p:cNvPr>
-          <p:cNvSpPr txBox="1"/>
-          <p:nvPr/>
-        </p:nvSpPr>
-        <p:spPr>
-          <a:xfrm>
-            <a:off x="5999571" y="-2485296"/>
-            <a:ext cx="607859" cy="1015663"/>
-          </a:xfrm>
-          <a:prstGeom prst="rect">
-            <a:avLst/>
-          </a:prstGeom>
-          <a:noFill/>
-        </p:spPr>
-        <p:txBody>
-          <a:bodyPr wrap="none" rtlCol="0">
-            <a:spAutoFit/>
-          </a:bodyPr>
-          <a:lstStyle/>
-          <a:p>
-            <a:r>
-              <a:rPr lang="en-US" sz="6000" b="1" dirty="0">
-                <a:solidFill>
-                  <a:schemeClr val="accent6"/>
-                </a:solidFill>
-              </a:rPr>
-              <a:t>X</a:t>
-            </a:r>
-          </a:p>
-        </p:txBody>
-      </p:sp>
-      <p:sp>
-        <p:nvSpPr>
-          <p:cNvPr id="246" name="TextBox 245">
-            <a:extLst>
-              <a:ext uri="{FF2B5EF4-FFF2-40B4-BE49-F238E27FC236}">
-                <a16:creationId xmlns:a16="http://schemas.microsoft.com/office/drawing/2014/main" id="{CA3666D0-94F0-293C-2334-8D2B1BA0256D}"/>
-              </a:ext>
-            </a:extLst>
-          </p:cNvPr>
-          <p:cNvSpPr txBox="1"/>
-          <p:nvPr/>
-        </p:nvSpPr>
-        <p:spPr>
-          <a:xfrm>
-            <a:off x="6007586" y="-206466"/>
-            <a:ext cx="583814" cy="1015663"/>
-          </a:xfrm>
-          <a:prstGeom prst="rect">
-            <a:avLst/>
-          </a:prstGeom>
-          <a:noFill/>
-        </p:spPr>
-        <p:txBody>
-          <a:bodyPr wrap="none" rtlCol="0">
-            <a:spAutoFit/>
-          </a:bodyPr>
-          <a:lstStyle/>
-          <a:p>
-            <a:r>
-              <a:rPr lang="en-US" sz="6000" b="1" dirty="0">
-                <a:solidFill>
-                  <a:schemeClr val="accent2"/>
-                </a:solidFill>
-              </a:rPr>
-              <a:t>Y</a:t>
-            </a:r>
-          </a:p>
-        </p:txBody>
-      </p:sp>
-      <p:cxnSp>
-        <p:nvCxnSpPr>
-          <p:cNvPr id="247" name="Straight Connector 246">
-            <a:extLst>
-              <a:ext uri="{FF2B5EF4-FFF2-40B4-BE49-F238E27FC236}">
-                <a16:creationId xmlns:a16="http://schemas.microsoft.com/office/drawing/2014/main" id="{DE8AA779-66A6-BCF0-C202-1EE9E3E7B83A}"/>
-              </a:ext>
-            </a:extLst>
-          </p:cNvPr>
-          <p:cNvCxnSpPr/>
-          <p:nvPr/>
-        </p:nvCxnSpPr>
-        <p:spPr>
-          <a:xfrm>
-            <a:off x="5430802" y="-588284"/>
-            <a:ext cx="12192000" cy="0"/>
-          </a:xfrm>
-          <a:prstGeom prst="line">
-            <a:avLst/>
-          </a:prstGeom>
-          <a:ln w="63500">
-            <a:solidFill>
-              <a:schemeClr val="tx1"/>
-            </a:solidFill>
-          </a:ln>
-        </p:spPr>
-        <p:style>
-          <a:lnRef idx="1">
-            <a:schemeClr val="accent1"/>
-          </a:lnRef>
-          <a:fillRef idx="0">
-            <a:schemeClr val="accent1"/>
-          </a:fillRef>
-          <a:effectRef idx="0">
-            <a:schemeClr val="accent1"/>
-          </a:effectRef>
-          <a:fontRef idx="minor">
-            <a:schemeClr val="tx1"/>
-          </a:fontRef>
-        </p:style>
-      </p:cxnSp>
-      <p:sp>
-        <p:nvSpPr>
-          <p:cNvPr id="248" name="TextBox 247">
-            <a:extLst>
-              <a:ext uri="{FF2B5EF4-FFF2-40B4-BE49-F238E27FC236}">
-                <a16:creationId xmlns:a16="http://schemas.microsoft.com/office/drawing/2014/main" id="{09D15362-D537-E95A-E90D-DA13424FC31C}"/>
-              </a:ext>
-            </a:extLst>
-          </p:cNvPr>
-          <p:cNvSpPr txBox="1"/>
-          <p:nvPr/>
-        </p:nvSpPr>
-        <p:spPr>
-          <a:xfrm>
-            <a:off x="13084971" y="-4437075"/>
-            <a:ext cx="1419528" cy="338554"/>
-          </a:xfrm>
-          <a:prstGeom prst="rect">
-            <a:avLst/>
-          </a:prstGeom>
-          <a:noFill/>
-        </p:spPr>
-        <p:txBody>
-          <a:bodyPr wrap="square" rtlCol="0">
-            <a:spAutoFit/>
-          </a:bodyPr>
-          <a:lstStyle/>
-          <a:p>
-            <a:pPr algn="ctr"/>
-            <a:r>
-              <a:rPr lang="en-US" sz="1600" b="1" dirty="0">
-                <a:solidFill>
-                  <a:schemeClr val="accent6">
-                    <a:lumMod val="75000"/>
-                  </a:schemeClr>
-                </a:solidFill>
-              </a:rPr>
-              <a:t>Donor: 400bp</a:t>
-            </a:r>
-          </a:p>
-        </p:txBody>
-      </p:sp>
-      <p:sp>
-        <p:nvSpPr>
-          <p:cNvPr id="249" name="TextBox 248">
-            <a:extLst>
-              <a:ext uri="{FF2B5EF4-FFF2-40B4-BE49-F238E27FC236}">
-                <a16:creationId xmlns:a16="http://schemas.microsoft.com/office/drawing/2014/main" id="{E8352E39-BEDA-007B-15A2-B7B9028DFBC9}"/>
-              </a:ext>
-            </a:extLst>
-          </p:cNvPr>
-          <p:cNvSpPr txBox="1"/>
-          <p:nvPr/>
-        </p:nvSpPr>
-        <p:spPr>
-          <a:xfrm>
-            <a:off x="14476366" y="-4441142"/>
-            <a:ext cx="1679611" cy="338554"/>
-          </a:xfrm>
-          <a:prstGeom prst="rect">
-            <a:avLst/>
-          </a:prstGeom>
-          <a:noFill/>
-        </p:spPr>
-        <p:txBody>
-          <a:bodyPr wrap="square" rtlCol="0">
-            <a:spAutoFit/>
-          </a:bodyPr>
-          <a:lstStyle/>
-          <a:p>
-            <a:pPr algn="ctr"/>
-            <a:r>
-              <a:rPr lang="en-US" sz="1600" b="1" dirty="0">
-                <a:solidFill>
-                  <a:srgbClr val="C00000"/>
-                </a:solidFill>
-              </a:rPr>
-              <a:t>Acceptor: 400bp</a:t>
-            </a:r>
-          </a:p>
-        </p:txBody>
-      </p:sp>
-      <p:sp>
-        <p:nvSpPr>
-          <p:cNvPr id="251" name="TextBox 250">
-            <a:extLst>
-              <a:ext uri="{FF2B5EF4-FFF2-40B4-BE49-F238E27FC236}">
-                <a16:creationId xmlns:a16="http://schemas.microsoft.com/office/drawing/2014/main" id="{261FCFC4-578C-DD4C-1D70-41A9D7B1EFE4}"/>
-              </a:ext>
-            </a:extLst>
-          </p:cNvPr>
-          <p:cNvSpPr txBox="1"/>
-          <p:nvPr/>
-        </p:nvSpPr>
-        <p:spPr>
-          <a:xfrm>
-            <a:off x="35791522" y="18638192"/>
-            <a:ext cx="2817951" cy="769441"/>
-          </a:xfrm>
-          <a:prstGeom prst="rect">
-            <a:avLst/>
-          </a:prstGeom>
-          <a:noFill/>
-        </p:spPr>
-        <p:txBody>
-          <a:bodyPr wrap="none" rtlCol="0">
-            <a:spAutoFit/>
-          </a:bodyPr>
-          <a:lstStyle/>
-          <a:p>
-            <a:r>
-              <a:rPr lang="en-US" sz="4400" dirty="0"/>
-              <a:t>GT-AG ratio</a:t>
-            </a:r>
-          </a:p>
-        </p:txBody>
-      </p:sp>
-      <p:sp>
-        <p:nvSpPr>
-          <p:cNvPr id="252" name="TextBox 251">
-            <a:extLst>
-              <a:ext uri="{FF2B5EF4-FFF2-40B4-BE49-F238E27FC236}">
-                <a16:creationId xmlns:a16="http://schemas.microsoft.com/office/drawing/2014/main" id="{3F043888-4EB9-A40D-424D-23444B6B80C9}"/>
-              </a:ext>
-            </a:extLst>
-          </p:cNvPr>
-          <p:cNvSpPr txBox="1"/>
-          <p:nvPr/>
-        </p:nvSpPr>
-        <p:spPr>
-          <a:xfrm>
-            <a:off x="40205991" y="18761302"/>
-            <a:ext cx="4358886" cy="646331"/>
-          </a:xfrm>
-          <a:prstGeom prst="rect">
-            <a:avLst/>
-          </a:prstGeom>
-          <a:noFill/>
-        </p:spPr>
-        <p:txBody>
-          <a:bodyPr wrap="none" rtlCol="0">
-            <a:spAutoFit/>
-          </a:bodyPr>
-          <a:lstStyle/>
-          <a:p>
-            <a:r>
-              <a:rPr lang="en-US" sz="3600" dirty="0"/>
-              <a:t>Base information ratio</a:t>
-            </a:r>
-          </a:p>
-        </p:txBody>
-      </p:sp>
-      <p:sp>
-        <p:nvSpPr>
-          <p:cNvPr id="255" name="Rounded Rectangle 254">
-            <a:extLst>
-              <a:ext uri="{FF2B5EF4-FFF2-40B4-BE49-F238E27FC236}">
-                <a16:creationId xmlns:a16="http://schemas.microsoft.com/office/drawing/2014/main" id="{95CC41BE-E9D7-E307-A3CD-83C5A1324E40}"/>
-              </a:ext>
-            </a:extLst>
-          </p:cNvPr>
-          <p:cNvSpPr/>
-          <p:nvPr/>
-        </p:nvSpPr>
-        <p:spPr>
-          <a:xfrm>
-            <a:off x="26639507" y="2245658"/>
-            <a:ext cx="569537" cy="6360459"/>
+            <a:off x="26784743" y="2421587"/>
+            <a:ext cx="569537" cy="6004317"/>
           </a:xfrm>
           <a:prstGeom prst="roundRect">
             <a:avLst/>
@@ -56016,66 +55677,1050 @@
           </a:p>
         </p:txBody>
       </p:sp>
-      <p:pic>
-        <p:nvPicPr>
-          <p:cNvPr id="257" name="Picture 256" descr="Chart, bar chart&#10;&#10;Description automatically generated">
-            <a:extLst>
-              <a:ext uri="{FF2B5EF4-FFF2-40B4-BE49-F238E27FC236}">
-                <a16:creationId xmlns:a16="http://schemas.microsoft.com/office/drawing/2014/main" id="{FF6F5887-C857-B1B2-2741-B21880110EF4}"/>
-              </a:ext>
-            </a:extLst>
-          </p:cNvPr>
-          <p:cNvPicPr>
-            <a:picLocks noChangeAspect="1"/>
-          </p:cNvPicPr>
-          <p:nvPr/>
-        </p:nvPicPr>
-        <p:blipFill>
-          <a:blip r:embed="rId2"/>
-          <a:stretch>
-            <a:fillRect/>
-          </a:stretch>
-        </p:blipFill>
-        <p:spPr>
-          <a:xfrm>
-            <a:off x="17552013" y="8688255"/>
-            <a:ext cx="6651202" cy="4988402"/>
+      <p:sp>
+        <p:nvSpPr>
+          <p:cNvPr id="260" name="TextBox 259">
+            <a:extLst>
+              <a:ext uri="{FF2B5EF4-FFF2-40B4-BE49-F238E27FC236}">
+                <a16:creationId xmlns:a16="http://schemas.microsoft.com/office/drawing/2014/main" id="{E3D2F157-CF65-81E6-ECCF-856976A6F114}"/>
+              </a:ext>
+            </a:extLst>
+          </p:cNvPr>
+          <p:cNvSpPr txBox="1"/>
+          <p:nvPr/>
+        </p:nvSpPr>
+        <p:spPr>
+          <a:xfrm>
+            <a:off x="23595746" y="2285037"/>
+            <a:ext cx="550151" cy="707886"/>
           </a:xfrm>
           <a:prstGeom prst="rect">
             <a:avLst/>
           </a:prstGeom>
-        </p:spPr>
-      </p:pic>
-      <p:pic>
-        <p:nvPicPr>
-          <p:cNvPr id="259" name="Picture 258" descr="Chart, bar chart&#10;&#10;Description automatically generated">
-            <a:extLst>
-              <a:ext uri="{FF2B5EF4-FFF2-40B4-BE49-F238E27FC236}">
-                <a16:creationId xmlns:a16="http://schemas.microsoft.com/office/drawing/2014/main" id="{4259B9FF-B7BF-2EAD-8950-180716A73C37}"/>
-              </a:ext>
-            </a:extLst>
-          </p:cNvPr>
-          <p:cNvPicPr>
-            <a:picLocks noChangeAspect="1"/>
-          </p:cNvPicPr>
-          <p:nvPr/>
-        </p:nvPicPr>
-        <p:blipFill>
-          <a:blip r:embed="rId3"/>
-          <a:stretch>
-            <a:fillRect/>
-          </a:stretch>
-        </p:blipFill>
-        <p:spPr>
-          <a:xfrm>
-            <a:off x="24326603" y="8688253"/>
-            <a:ext cx="6651191" cy="4988393"/>
+          <a:noFill/>
+          <a:ln w="50800">
+            <a:noFill/>
+          </a:ln>
+        </p:spPr>
+        <p:style>
+          <a:lnRef idx="2">
+            <a:schemeClr val="accent6">
+              <a:shade val="50000"/>
+            </a:schemeClr>
+          </a:lnRef>
+          <a:fillRef idx="1">
+            <a:schemeClr val="accent6"/>
+          </a:fillRef>
+          <a:effectRef idx="0">
+            <a:schemeClr val="accent6"/>
+          </a:effectRef>
+          <a:fontRef idx="minor">
+            <a:schemeClr val="lt1"/>
+          </a:fontRef>
+        </p:style>
+        <p:txBody>
+          <a:bodyPr wrap="none" rtlCol="0">
+            <a:spAutoFit/>
+          </a:bodyPr>
+          <a:lstStyle/>
+          <a:p>
+            <a:r>
+              <a:rPr lang="en-US" sz="4000" b="1" dirty="0">
+                <a:solidFill>
+                  <a:schemeClr val="tx1"/>
+                </a:solidFill>
+              </a:rPr>
+              <a:t>…</a:t>
+            </a:r>
+          </a:p>
+        </p:txBody>
+      </p:sp>
+      <p:sp>
+        <p:nvSpPr>
+          <p:cNvPr id="261" name="TextBox 260">
+            <a:extLst>
+              <a:ext uri="{FF2B5EF4-FFF2-40B4-BE49-F238E27FC236}">
+                <a16:creationId xmlns:a16="http://schemas.microsoft.com/office/drawing/2014/main" id="{2F2FAACA-7910-3B86-3FCD-BD5814245810}"/>
+              </a:ext>
+            </a:extLst>
+          </p:cNvPr>
+          <p:cNvSpPr txBox="1"/>
+          <p:nvPr/>
+        </p:nvSpPr>
+        <p:spPr>
+          <a:xfrm>
+            <a:off x="24937465" y="2295927"/>
+            <a:ext cx="550151" cy="707886"/>
           </a:xfrm>
           <a:prstGeom prst="rect">
             <a:avLst/>
           </a:prstGeom>
-        </p:spPr>
-      </p:pic>
+          <a:noFill/>
+          <a:ln w="50800">
+            <a:noFill/>
+          </a:ln>
+        </p:spPr>
+        <p:style>
+          <a:lnRef idx="2">
+            <a:schemeClr val="accent6">
+              <a:shade val="50000"/>
+            </a:schemeClr>
+          </a:lnRef>
+          <a:fillRef idx="1">
+            <a:schemeClr val="accent6"/>
+          </a:fillRef>
+          <a:effectRef idx="0">
+            <a:schemeClr val="accent6"/>
+          </a:effectRef>
+          <a:fontRef idx="minor">
+            <a:schemeClr val="lt1"/>
+          </a:fontRef>
+        </p:style>
+        <p:txBody>
+          <a:bodyPr wrap="none" rtlCol="0">
+            <a:spAutoFit/>
+          </a:bodyPr>
+          <a:lstStyle/>
+          <a:p>
+            <a:r>
+              <a:rPr lang="en-US" sz="4000" b="1" dirty="0">
+                <a:solidFill>
+                  <a:schemeClr val="tx1"/>
+                </a:solidFill>
+              </a:rPr>
+              <a:t>…</a:t>
+            </a:r>
+          </a:p>
+        </p:txBody>
+      </p:sp>
+      <p:sp>
+        <p:nvSpPr>
+          <p:cNvPr id="270" name="TextBox 269">
+            <a:extLst>
+              <a:ext uri="{FF2B5EF4-FFF2-40B4-BE49-F238E27FC236}">
+                <a16:creationId xmlns:a16="http://schemas.microsoft.com/office/drawing/2014/main" id="{DDCABE20-EC75-6C4D-C253-3C954ACC96C9}"/>
+              </a:ext>
+            </a:extLst>
+          </p:cNvPr>
+          <p:cNvSpPr txBox="1"/>
+          <p:nvPr/>
+        </p:nvSpPr>
+        <p:spPr>
+          <a:xfrm>
+            <a:off x="20567764" y="2284504"/>
+            <a:ext cx="550151" cy="707886"/>
+          </a:xfrm>
+          <a:prstGeom prst="rect">
+            <a:avLst/>
+          </a:prstGeom>
+          <a:noFill/>
+          <a:ln w="50800">
+            <a:noFill/>
+          </a:ln>
+        </p:spPr>
+        <p:style>
+          <a:lnRef idx="2">
+            <a:schemeClr val="accent6">
+              <a:shade val="50000"/>
+            </a:schemeClr>
+          </a:lnRef>
+          <a:fillRef idx="1">
+            <a:schemeClr val="accent6"/>
+          </a:fillRef>
+          <a:effectRef idx="0">
+            <a:schemeClr val="accent6"/>
+          </a:effectRef>
+          <a:fontRef idx="minor">
+            <a:schemeClr val="lt1"/>
+          </a:fontRef>
+        </p:style>
+        <p:txBody>
+          <a:bodyPr wrap="none" rtlCol="0">
+            <a:spAutoFit/>
+          </a:bodyPr>
+          <a:lstStyle/>
+          <a:p>
+            <a:r>
+              <a:rPr lang="en-US" sz="4000" b="1" dirty="0">
+                <a:solidFill>
+                  <a:schemeClr val="tx1"/>
+                </a:solidFill>
+              </a:rPr>
+              <a:t>…</a:t>
+            </a:r>
+          </a:p>
+        </p:txBody>
+      </p:sp>
+      <p:sp>
+        <p:nvSpPr>
+          <p:cNvPr id="271" name="TextBox 270">
+            <a:extLst>
+              <a:ext uri="{FF2B5EF4-FFF2-40B4-BE49-F238E27FC236}">
+                <a16:creationId xmlns:a16="http://schemas.microsoft.com/office/drawing/2014/main" id="{30668309-FA15-3ED4-1D64-D868465290D2}"/>
+              </a:ext>
+            </a:extLst>
+          </p:cNvPr>
+          <p:cNvSpPr txBox="1"/>
+          <p:nvPr/>
+        </p:nvSpPr>
+        <p:spPr>
+          <a:xfrm>
+            <a:off x="27983776" y="2274431"/>
+            <a:ext cx="550151" cy="707886"/>
+          </a:xfrm>
+          <a:prstGeom prst="rect">
+            <a:avLst/>
+          </a:prstGeom>
+          <a:noFill/>
+          <a:ln w="50800">
+            <a:noFill/>
+          </a:ln>
+        </p:spPr>
+        <p:style>
+          <a:lnRef idx="2">
+            <a:schemeClr val="accent6">
+              <a:shade val="50000"/>
+            </a:schemeClr>
+          </a:lnRef>
+          <a:fillRef idx="1">
+            <a:schemeClr val="accent6"/>
+          </a:fillRef>
+          <a:effectRef idx="0">
+            <a:schemeClr val="accent6"/>
+          </a:effectRef>
+          <a:fontRef idx="minor">
+            <a:schemeClr val="lt1"/>
+          </a:fontRef>
+        </p:style>
+        <p:txBody>
+          <a:bodyPr wrap="none" rtlCol="0">
+            <a:spAutoFit/>
+          </a:bodyPr>
+          <a:lstStyle/>
+          <a:p>
+            <a:r>
+              <a:rPr lang="en-US" sz="4000" b="1" dirty="0">
+                <a:solidFill>
+                  <a:schemeClr val="tx1"/>
+                </a:solidFill>
+              </a:rPr>
+              <a:t>…</a:t>
+            </a:r>
+          </a:p>
+        </p:txBody>
+      </p:sp>
+      <p:sp>
+        <p:nvSpPr>
+          <p:cNvPr id="275" name="TextBox 274">
+            <a:extLst>
+              <a:ext uri="{FF2B5EF4-FFF2-40B4-BE49-F238E27FC236}">
+                <a16:creationId xmlns:a16="http://schemas.microsoft.com/office/drawing/2014/main" id="{376A92DC-5604-BF45-FAF4-4E767991DCAC}"/>
+              </a:ext>
+            </a:extLst>
+          </p:cNvPr>
+          <p:cNvSpPr txBox="1"/>
+          <p:nvPr/>
+        </p:nvSpPr>
+        <p:spPr>
+          <a:xfrm>
+            <a:off x="20586445" y="6220505"/>
+            <a:ext cx="550151" cy="707886"/>
+          </a:xfrm>
+          <a:prstGeom prst="rect">
+            <a:avLst/>
+          </a:prstGeom>
+          <a:noFill/>
+          <a:ln w="50800">
+            <a:noFill/>
+          </a:ln>
+        </p:spPr>
+        <p:style>
+          <a:lnRef idx="2">
+            <a:schemeClr val="accent2">
+              <a:shade val="50000"/>
+            </a:schemeClr>
+          </a:lnRef>
+          <a:fillRef idx="1">
+            <a:schemeClr val="accent2"/>
+          </a:fillRef>
+          <a:effectRef idx="0">
+            <a:schemeClr val="accent2"/>
+          </a:effectRef>
+          <a:fontRef idx="minor">
+            <a:schemeClr val="lt1"/>
+          </a:fontRef>
+        </p:style>
+        <p:txBody>
+          <a:bodyPr wrap="none" rtlCol="0">
+            <a:spAutoFit/>
+          </a:bodyPr>
+          <a:lstStyle/>
+          <a:p>
+            <a:r>
+              <a:rPr lang="en-US" sz="4000" b="1" dirty="0">
+                <a:solidFill>
+                  <a:schemeClr val="tx1"/>
+                </a:solidFill>
+              </a:rPr>
+              <a:t>…</a:t>
+            </a:r>
+          </a:p>
+        </p:txBody>
+      </p:sp>
+      <p:sp>
+        <p:nvSpPr>
+          <p:cNvPr id="276" name="TextBox 275">
+            <a:extLst>
+              <a:ext uri="{FF2B5EF4-FFF2-40B4-BE49-F238E27FC236}">
+                <a16:creationId xmlns:a16="http://schemas.microsoft.com/office/drawing/2014/main" id="{0FA065A1-B76C-5598-F2E2-8DA3C7173905}"/>
+              </a:ext>
+            </a:extLst>
+          </p:cNvPr>
+          <p:cNvSpPr txBox="1"/>
+          <p:nvPr/>
+        </p:nvSpPr>
+        <p:spPr>
+          <a:xfrm>
+            <a:off x="20586445" y="6847285"/>
+            <a:ext cx="550151" cy="707886"/>
+          </a:xfrm>
+          <a:prstGeom prst="rect">
+            <a:avLst/>
+          </a:prstGeom>
+          <a:noFill/>
+          <a:ln w="50800">
+            <a:noFill/>
+          </a:ln>
+        </p:spPr>
+        <p:style>
+          <a:lnRef idx="2">
+            <a:schemeClr val="accent2">
+              <a:shade val="50000"/>
+            </a:schemeClr>
+          </a:lnRef>
+          <a:fillRef idx="1">
+            <a:schemeClr val="accent2"/>
+          </a:fillRef>
+          <a:effectRef idx="0">
+            <a:schemeClr val="accent2"/>
+          </a:effectRef>
+          <a:fontRef idx="minor">
+            <a:schemeClr val="lt1"/>
+          </a:fontRef>
+        </p:style>
+        <p:txBody>
+          <a:bodyPr wrap="none" rtlCol="0">
+            <a:spAutoFit/>
+          </a:bodyPr>
+          <a:lstStyle/>
+          <a:p>
+            <a:r>
+              <a:rPr lang="en-US" sz="4000" b="1" dirty="0">
+                <a:solidFill>
+                  <a:schemeClr val="tx1"/>
+                </a:solidFill>
+              </a:rPr>
+              <a:t>…</a:t>
+            </a:r>
+          </a:p>
+        </p:txBody>
+      </p:sp>
+      <p:sp>
+        <p:nvSpPr>
+          <p:cNvPr id="277" name="TextBox 276">
+            <a:extLst>
+              <a:ext uri="{FF2B5EF4-FFF2-40B4-BE49-F238E27FC236}">
+                <a16:creationId xmlns:a16="http://schemas.microsoft.com/office/drawing/2014/main" id="{60D591AA-4815-D67F-3045-9171854F5CBC}"/>
+              </a:ext>
+            </a:extLst>
+          </p:cNvPr>
+          <p:cNvSpPr txBox="1"/>
+          <p:nvPr/>
+        </p:nvSpPr>
+        <p:spPr>
+          <a:xfrm>
+            <a:off x="20586445" y="7463115"/>
+            <a:ext cx="550151" cy="707886"/>
+          </a:xfrm>
+          <a:prstGeom prst="rect">
+            <a:avLst/>
+          </a:prstGeom>
+          <a:noFill/>
+          <a:ln w="50800">
+            <a:noFill/>
+          </a:ln>
+        </p:spPr>
+        <p:style>
+          <a:lnRef idx="2">
+            <a:schemeClr val="accent2">
+              <a:shade val="50000"/>
+            </a:schemeClr>
+          </a:lnRef>
+          <a:fillRef idx="1">
+            <a:schemeClr val="accent2"/>
+          </a:fillRef>
+          <a:effectRef idx="0">
+            <a:schemeClr val="accent2"/>
+          </a:effectRef>
+          <a:fontRef idx="minor">
+            <a:schemeClr val="lt1"/>
+          </a:fontRef>
+        </p:style>
+        <p:txBody>
+          <a:bodyPr wrap="none" rtlCol="0">
+            <a:spAutoFit/>
+          </a:bodyPr>
+          <a:lstStyle/>
+          <a:p>
+            <a:r>
+              <a:rPr lang="en-US" sz="4000" b="1" dirty="0">
+                <a:solidFill>
+                  <a:schemeClr val="tx1"/>
+                </a:solidFill>
+              </a:rPr>
+              <a:t>…</a:t>
+            </a:r>
+          </a:p>
+        </p:txBody>
+      </p:sp>
+      <p:sp>
+        <p:nvSpPr>
+          <p:cNvPr id="278" name="TextBox 277">
+            <a:extLst>
+              <a:ext uri="{FF2B5EF4-FFF2-40B4-BE49-F238E27FC236}">
+                <a16:creationId xmlns:a16="http://schemas.microsoft.com/office/drawing/2014/main" id="{9289D084-63D7-C548-C573-B1DCEC85CDF9}"/>
+              </a:ext>
+            </a:extLst>
+          </p:cNvPr>
+          <p:cNvSpPr txBox="1"/>
+          <p:nvPr/>
+        </p:nvSpPr>
+        <p:spPr>
+          <a:xfrm>
+            <a:off x="27961117" y="6220505"/>
+            <a:ext cx="550151" cy="707886"/>
+          </a:xfrm>
+          <a:prstGeom prst="rect">
+            <a:avLst/>
+          </a:prstGeom>
+          <a:noFill/>
+          <a:ln w="50800">
+            <a:noFill/>
+          </a:ln>
+        </p:spPr>
+        <p:style>
+          <a:lnRef idx="2">
+            <a:schemeClr val="accent2">
+              <a:shade val="50000"/>
+            </a:schemeClr>
+          </a:lnRef>
+          <a:fillRef idx="1">
+            <a:schemeClr val="accent2"/>
+          </a:fillRef>
+          <a:effectRef idx="0">
+            <a:schemeClr val="accent2"/>
+          </a:effectRef>
+          <a:fontRef idx="minor">
+            <a:schemeClr val="lt1"/>
+          </a:fontRef>
+        </p:style>
+        <p:txBody>
+          <a:bodyPr wrap="none" rtlCol="0">
+            <a:spAutoFit/>
+          </a:bodyPr>
+          <a:lstStyle/>
+          <a:p>
+            <a:r>
+              <a:rPr lang="en-US" sz="4000" b="1" dirty="0">
+                <a:solidFill>
+                  <a:schemeClr val="tx1"/>
+                </a:solidFill>
+              </a:rPr>
+              <a:t>…</a:t>
+            </a:r>
+          </a:p>
+        </p:txBody>
+      </p:sp>
+      <p:sp>
+        <p:nvSpPr>
+          <p:cNvPr id="279" name="TextBox 278">
+            <a:extLst>
+              <a:ext uri="{FF2B5EF4-FFF2-40B4-BE49-F238E27FC236}">
+                <a16:creationId xmlns:a16="http://schemas.microsoft.com/office/drawing/2014/main" id="{7DBD0E4D-7E89-0CAE-89A1-F36CFCC9E14F}"/>
+              </a:ext>
+            </a:extLst>
+          </p:cNvPr>
+          <p:cNvSpPr txBox="1"/>
+          <p:nvPr/>
+        </p:nvSpPr>
+        <p:spPr>
+          <a:xfrm>
+            <a:off x="27961117" y="6847285"/>
+            <a:ext cx="550151" cy="707886"/>
+          </a:xfrm>
+          <a:prstGeom prst="rect">
+            <a:avLst/>
+          </a:prstGeom>
+          <a:noFill/>
+          <a:ln w="50800">
+            <a:noFill/>
+          </a:ln>
+        </p:spPr>
+        <p:style>
+          <a:lnRef idx="2">
+            <a:schemeClr val="accent2">
+              <a:shade val="50000"/>
+            </a:schemeClr>
+          </a:lnRef>
+          <a:fillRef idx="1">
+            <a:schemeClr val="accent2"/>
+          </a:fillRef>
+          <a:effectRef idx="0">
+            <a:schemeClr val="accent2"/>
+          </a:effectRef>
+          <a:fontRef idx="minor">
+            <a:schemeClr val="lt1"/>
+          </a:fontRef>
+        </p:style>
+        <p:txBody>
+          <a:bodyPr wrap="none" rtlCol="0">
+            <a:spAutoFit/>
+          </a:bodyPr>
+          <a:lstStyle/>
+          <a:p>
+            <a:r>
+              <a:rPr lang="en-US" sz="4000" b="1" dirty="0">
+                <a:solidFill>
+                  <a:schemeClr val="tx1"/>
+                </a:solidFill>
+              </a:rPr>
+              <a:t>…</a:t>
+            </a:r>
+          </a:p>
+        </p:txBody>
+      </p:sp>
+      <p:sp>
+        <p:nvSpPr>
+          <p:cNvPr id="280" name="TextBox 279">
+            <a:extLst>
+              <a:ext uri="{FF2B5EF4-FFF2-40B4-BE49-F238E27FC236}">
+                <a16:creationId xmlns:a16="http://schemas.microsoft.com/office/drawing/2014/main" id="{F4F41F4F-661D-7A57-8E89-0ADA61E7B2D1}"/>
+              </a:ext>
+            </a:extLst>
+          </p:cNvPr>
+          <p:cNvSpPr txBox="1"/>
+          <p:nvPr/>
+        </p:nvSpPr>
+        <p:spPr>
+          <a:xfrm>
+            <a:off x="27961117" y="7463115"/>
+            <a:ext cx="550151" cy="707886"/>
+          </a:xfrm>
+          <a:prstGeom prst="rect">
+            <a:avLst/>
+          </a:prstGeom>
+          <a:noFill/>
+          <a:ln w="50800">
+            <a:noFill/>
+          </a:ln>
+        </p:spPr>
+        <p:style>
+          <a:lnRef idx="2">
+            <a:schemeClr val="accent2">
+              <a:shade val="50000"/>
+            </a:schemeClr>
+          </a:lnRef>
+          <a:fillRef idx="1">
+            <a:schemeClr val="accent2"/>
+          </a:fillRef>
+          <a:effectRef idx="0">
+            <a:schemeClr val="accent2"/>
+          </a:effectRef>
+          <a:fontRef idx="minor">
+            <a:schemeClr val="lt1"/>
+          </a:fontRef>
+        </p:style>
+        <p:txBody>
+          <a:bodyPr wrap="none" rtlCol="0">
+            <a:spAutoFit/>
+          </a:bodyPr>
+          <a:lstStyle/>
+          <a:p>
+            <a:r>
+              <a:rPr lang="en-US" sz="4000" b="1" dirty="0">
+                <a:solidFill>
+                  <a:schemeClr val="tx1"/>
+                </a:solidFill>
+              </a:rPr>
+              <a:t>…</a:t>
+            </a:r>
+          </a:p>
+        </p:txBody>
+      </p:sp>
+      <p:sp>
+        <p:nvSpPr>
+          <p:cNvPr id="281" name="TextBox 280">
+            <a:extLst>
+              <a:ext uri="{FF2B5EF4-FFF2-40B4-BE49-F238E27FC236}">
+                <a16:creationId xmlns:a16="http://schemas.microsoft.com/office/drawing/2014/main" id="{A04EB571-5C10-BACB-3294-18DFD925B6EC}"/>
+              </a:ext>
+            </a:extLst>
+          </p:cNvPr>
+          <p:cNvSpPr txBox="1"/>
+          <p:nvPr/>
+        </p:nvSpPr>
+        <p:spPr>
+          <a:xfrm>
+            <a:off x="27961117" y="3404640"/>
+            <a:ext cx="550151" cy="707886"/>
+          </a:xfrm>
+          <a:prstGeom prst="rect">
+            <a:avLst/>
+          </a:prstGeom>
+          <a:noFill/>
+          <a:ln w="50800">
+            <a:noFill/>
+          </a:ln>
+        </p:spPr>
+        <p:style>
+          <a:lnRef idx="2">
+            <a:schemeClr val="accent6">
+              <a:shade val="50000"/>
+            </a:schemeClr>
+          </a:lnRef>
+          <a:fillRef idx="1">
+            <a:schemeClr val="accent6"/>
+          </a:fillRef>
+          <a:effectRef idx="0">
+            <a:schemeClr val="accent6"/>
+          </a:effectRef>
+          <a:fontRef idx="minor">
+            <a:schemeClr val="lt1"/>
+          </a:fontRef>
+        </p:style>
+        <p:txBody>
+          <a:bodyPr wrap="none" rtlCol="0">
+            <a:spAutoFit/>
+          </a:bodyPr>
+          <a:lstStyle/>
+          <a:p>
+            <a:r>
+              <a:rPr lang="en-US" sz="4000" b="1" dirty="0">
+                <a:solidFill>
+                  <a:schemeClr val="tx1"/>
+                </a:solidFill>
+              </a:rPr>
+              <a:t>…</a:t>
+            </a:r>
+          </a:p>
+        </p:txBody>
+      </p:sp>
+      <p:sp>
+        <p:nvSpPr>
+          <p:cNvPr id="282" name="TextBox 281">
+            <a:extLst>
+              <a:ext uri="{FF2B5EF4-FFF2-40B4-BE49-F238E27FC236}">
+                <a16:creationId xmlns:a16="http://schemas.microsoft.com/office/drawing/2014/main" id="{C2E59796-25BB-B7F3-ECEF-528419BE91CA}"/>
+              </a:ext>
+            </a:extLst>
+          </p:cNvPr>
+          <p:cNvSpPr txBox="1"/>
+          <p:nvPr/>
+        </p:nvSpPr>
+        <p:spPr>
+          <a:xfrm>
+            <a:off x="27961117" y="4031422"/>
+            <a:ext cx="550151" cy="707886"/>
+          </a:xfrm>
+          <a:prstGeom prst="rect">
+            <a:avLst/>
+          </a:prstGeom>
+          <a:noFill/>
+          <a:ln w="50800">
+            <a:noFill/>
+          </a:ln>
+        </p:spPr>
+        <p:style>
+          <a:lnRef idx="2">
+            <a:schemeClr val="accent6">
+              <a:shade val="50000"/>
+            </a:schemeClr>
+          </a:lnRef>
+          <a:fillRef idx="1">
+            <a:schemeClr val="accent6"/>
+          </a:fillRef>
+          <a:effectRef idx="0">
+            <a:schemeClr val="accent6"/>
+          </a:effectRef>
+          <a:fontRef idx="minor">
+            <a:schemeClr val="lt1"/>
+          </a:fontRef>
+        </p:style>
+        <p:txBody>
+          <a:bodyPr wrap="none" rtlCol="0">
+            <a:spAutoFit/>
+          </a:bodyPr>
+          <a:lstStyle/>
+          <a:p>
+            <a:r>
+              <a:rPr lang="en-US" sz="4000" b="1" dirty="0">
+                <a:solidFill>
+                  <a:schemeClr val="tx1"/>
+                </a:solidFill>
+              </a:rPr>
+              <a:t>…</a:t>
+            </a:r>
+          </a:p>
+        </p:txBody>
+      </p:sp>
+      <p:sp>
+        <p:nvSpPr>
+          <p:cNvPr id="283" name="TextBox 282">
+            <a:extLst>
+              <a:ext uri="{FF2B5EF4-FFF2-40B4-BE49-F238E27FC236}">
+                <a16:creationId xmlns:a16="http://schemas.microsoft.com/office/drawing/2014/main" id="{1421340C-4E3E-FB3B-D170-98598CA851CE}"/>
+              </a:ext>
+            </a:extLst>
+          </p:cNvPr>
+          <p:cNvSpPr txBox="1"/>
+          <p:nvPr/>
+        </p:nvSpPr>
+        <p:spPr>
+          <a:xfrm>
+            <a:off x="27961117" y="4647251"/>
+            <a:ext cx="550151" cy="707886"/>
+          </a:xfrm>
+          <a:prstGeom prst="rect">
+            <a:avLst/>
+          </a:prstGeom>
+          <a:noFill/>
+          <a:ln w="50800">
+            <a:noFill/>
+          </a:ln>
+        </p:spPr>
+        <p:style>
+          <a:lnRef idx="2">
+            <a:schemeClr val="accent6">
+              <a:shade val="50000"/>
+            </a:schemeClr>
+          </a:lnRef>
+          <a:fillRef idx="1">
+            <a:schemeClr val="accent6"/>
+          </a:fillRef>
+          <a:effectRef idx="0">
+            <a:schemeClr val="accent6"/>
+          </a:effectRef>
+          <a:fontRef idx="minor">
+            <a:schemeClr val="lt1"/>
+          </a:fontRef>
+        </p:style>
+        <p:txBody>
+          <a:bodyPr wrap="none" rtlCol="0">
+            <a:spAutoFit/>
+          </a:bodyPr>
+          <a:lstStyle/>
+          <a:p>
+            <a:r>
+              <a:rPr lang="en-US" sz="4000" b="1" dirty="0">
+                <a:solidFill>
+                  <a:schemeClr val="tx1"/>
+                </a:solidFill>
+              </a:rPr>
+              <a:t>…</a:t>
+            </a:r>
+          </a:p>
+        </p:txBody>
+      </p:sp>
+      <p:sp>
+        <p:nvSpPr>
+          <p:cNvPr id="284" name="TextBox 283">
+            <a:extLst>
+              <a:ext uri="{FF2B5EF4-FFF2-40B4-BE49-F238E27FC236}">
+                <a16:creationId xmlns:a16="http://schemas.microsoft.com/office/drawing/2014/main" id="{1206A6AF-4156-6C6F-5DD7-578B1699A0BF}"/>
+              </a:ext>
+            </a:extLst>
+          </p:cNvPr>
+          <p:cNvSpPr txBox="1"/>
+          <p:nvPr/>
+        </p:nvSpPr>
+        <p:spPr>
+          <a:xfrm>
+            <a:off x="27961116" y="5274030"/>
+            <a:ext cx="550151" cy="707886"/>
+          </a:xfrm>
+          <a:prstGeom prst="rect">
+            <a:avLst/>
+          </a:prstGeom>
+          <a:noFill/>
+          <a:ln w="50800">
+            <a:noFill/>
+          </a:ln>
+        </p:spPr>
+        <p:style>
+          <a:lnRef idx="2">
+            <a:schemeClr val="accent6">
+              <a:shade val="50000"/>
+            </a:schemeClr>
+          </a:lnRef>
+          <a:fillRef idx="1">
+            <a:schemeClr val="accent6"/>
+          </a:fillRef>
+          <a:effectRef idx="0">
+            <a:schemeClr val="accent6"/>
+          </a:effectRef>
+          <a:fontRef idx="minor">
+            <a:schemeClr val="lt1"/>
+          </a:fontRef>
+        </p:style>
+        <p:txBody>
+          <a:bodyPr wrap="none" rtlCol="0">
+            <a:spAutoFit/>
+          </a:bodyPr>
+          <a:lstStyle/>
+          <a:p>
+            <a:r>
+              <a:rPr lang="en-US" sz="4000" b="1" dirty="0">
+                <a:solidFill>
+                  <a:schemeClr val="tx1"/>
+                </a:solidFill>
+              </a:rPr>
+              <a:t>…</a:t>
+            </a:r>
+          </a:p>
+        </p:txBody>
+      </p:sp>
+      <p:sp>
+        <p:nvSpPr>
+          <p:cNvPr id="285" name="TextBox 284">
+            <a:extLst>
+              <a:ext uri="{FF2B5EF4-FFF2-40B4-BE49-F238E27FC236}">
+                <a16:creationId xmlns:a16="http://schemas.microsoft.com/office/drawing/2014/main" id="{58D6AE47-9F20-B6EE-8154-A5E94B49B5CC}"/>
+              </a:ext>
+            </a:extLst>
+          </p:cNvPr>
+          <p:cNvSpPr txBox="1"/>
+          <p:nvPr/>
+        </p:nvSpPr>
+        <p:spPr>
+          <a:xfrm>
+            <a:off x="20571102" y="3401321"/>
+            <a:ext cx="550151" cy="707886"/>
+          </a:xfrm>
+          <a:prstGeom prst="rect">
+            <a:avLst/>
+          </a:prstGeom>
+          <a:noFill/>
+          <a:ln w="50800">
+            <a:noFill/>
+          </a:ln>
+        </p:spPr>
+        <p:style>
+          <a:lnRef idx="2">
+            <a:schemeClr val="accent6">
+              <a:shade val="50000"/>
+            </a:schemeClr>
+          </a:lnRef>
+          <a:fillRef idx="1">
+            <a:schemeClr val="accent6"/>
+          </a:fillRef>
+          <a:effectRef idx="0">
+            <a:schemeClr val="accent6"/>
+          </a:effectRef>
+          <a:fontRef idx="minor">
+            <a:schemeClr val="lt1"/>
+          </a:fontRef>
+        </p:style>
+        <p:txBody>
+          <a:bodyPr wrap="none" rtlCol="0">
+            <a:spAutoFit/>
+          </a:bodyPr>
+          <a:lstStyle/>
+          <a:p>
+            <a:r>
+              <a:rPr lang="en-US" sz="4000" b="1" dirty="0">
+                <a:solidFill>
+                  <a:schemeClr val="tx1"/>
+                </a:solidFill>
+              </a:rPr>
+              <a:t>…</a:t>
+            </a:r>
+          </a:p>
+        </p:txBody>
+      </p:sp>
+      <p:sp>
+        <p:nvSpPr>
+          <p:cNvPr id="286" name="TextBox 285">
+            <a:extLst>
+              <a:ext uri="{FF2B5EF4-FFF2-40B4-BE49-F238E27FC236}">
+                <a16:creationId xmlns:a16="http://schemas.microsoft.com/office/drawing/2014/main" id="{8114F09D-298E-42CD-C373-92AF66A11B4B}"/>
+              </a:ext>
+            </a:extLst>
+          </p:cNvPr>
+          <p:cNvSpPr txBox="1"/>
+          <p:nvPr/>
+        </p:nvSpPr>
+        <p:spPr>
+          <a:xfrm>
+            <a:off x="20571102" y="4028103"/>
+            <a:ext cx="550151" cy="707886"/>
+          </a:xfrm>
+          <a:prstGeom prst="rect">
+            <a:avLst/>
+          </a:prstGeom>
+          <a:noFill/>
+          <a:ln w="50800">
+            <a:noFill/>
+          </a:ln>
+        </p:spPr>
+        <p:style>
+          <a:lnRef idx="2">
+            <a:schemeClr val="accent6">
+              <a:shade val="50000"/>
+            </a:schemeClr>
+          </a:lnRef>
+          <a:fillRef idx="1">
+            <a:schemeClr val="accent6"/>
+          </a:fillRef>
+          <a:effectRef idx="0">
+            <a:schemeClr val="accent6"/>
+          </a:effectRef>
+          <a:fontRef idx="minor">
+            <a:schemeClr val="lt1"/>
+          </a:fontRef>
+        </p:style>
+        <p:txBody>
+          <a:bodyPr wrap="none" rtlCol="0">
+            <a:spAutoFit/>
+          </a:bodyPr>
+          <a:lstStyle/>
+          <a:p>
+            <a:r>
+              <a:rPr lang="en-US" sz="4000" b="1" dirty="0">
+                <a:solidFill>
+                  <a:schemeClr val="tx1"/>
+                </a:solidFill>
+              </a:rPr>
+              <a:t>…</a:t>
+            </a:r>
+          </a:p>
+        </p:txBody>
+      </p:sp>
+      <p:sp>
+        <p:nvSpPr>
+          <p:cNvPr id="287" name="TextBox 286">
+            <a:extLst>
+              <a:ext uri="{FF2B5EF4-FFF2-40B4-BE49-F238E27FC236}">
+                <a16:creationId xmlns:a16="http://schemas.microsoft.com/office/drawing/2014/main" id="{06CB5B70-5D18-7070-AB17-FA86014D31CB}"/>
+              </a:ext>
+            </a:extLst>
+          </p:cNvPr>
+          <p:cNvSpPr txBox="1"/>
+          <p:nvPr/>
+        </p:nvSpPr>
+        <p:spPr>
+          <a:xfrm>
+            <a:off x="20571102" y="4643932"/>
+            <a:ext cx="550151" cy="707886"/>
+          </a:xfrm>
+          <a:prstGeom prst="rect">
+            <a:avLst/>
+          </a:prstGeom>
+          <a:noFill/>
+          <a:ln w="50800">
+            <a:noFill/>
+          </a:ln>
+        </p:spPr>
+        <p:style>
+          <a:lnRef idx="2">
+            <a:schemeClr val="accent6">
+              <a:shade val="50000"/>
+            </a:schemeClr>
+          </a:lnRef>
+          <a:fillRef idx="1">
+            <a:schemeClr val="accent6"/>
+          </a:fillRef>
+          <a:effectRef idx="0">
+            <a:schemeClr val="accent6"/>
+          </a:effectRef>
+          <a:fontRef idx="minor">
+            <a:schemeClr val="lt1"/>
+          </a:fontRef>
+        </p:style>
+        <p:txBody>
+          <a:bodyPr wrap="none" rtlCol="0">
+            <a:spAutoFit/>
+          </a:bodyPr>
+          <a:lstStyle/>
+          <a:p>
+            <a:r>
+              <a:rPr lang="en-US" sz="4000" b="1" dirty="0">
+                <a:solidFill>
+                  <a:schemeClr val="tx1"/>
+                </a:solidFill>
+              </a:rPr>
+              <a:t>…</a:t>
+            </a:r>
+          </a:p>
+        </p:txBody>
+      </p:sp>
+      <p:sp>
+        <p:nvSpPr>
+          <p:cNvPr id="288" name="TextBox 287">
+            <a:extLst>
+              <a:ext uri="{FF2B5EF4-FFF2-40B4-BE49-F238E27FC236}">
+                <a16:creationId xmlns:a16="http://schemas.microsoft.com/office/drawing/2014/main" id="{9DF67AEB-4D76-290C-B48C-4C5C6C29FCDA}"/>
+              </a:ext>
+            </a:extLst>
+          </p:cNvPr>
+          <p:cNvSpPr txBox="1"/>
+          <p:nvPr/>
+        </p:nvSpPr>
+        <p:spPr>
+          <a:xfrm>
+            <a:off x="20571101" y="5270711"/>
+            <a:ext cx="550151" cy="707886"/>
+          </a:xfrm>
+          <a:prstGeom prst="rect">
+            <a:avLst/>
+          </a:prstGeom>
+          <a:noFill/>
+          <a:ln w="50800">
+            <a:noFill/>
+          </a:ln>
+        </p:spPr>
+        <p:style>
+          <a:lnRef idx="2">
+            <a:schemeClr val="accent6">
+              <a:shade val="50000"/>
+            </a:schemeClr>
+          </a:lnRef>
+          <a:fillRef idx="1">
+            <a:schemeClr val="accent6"/>
+          </a:fillRef>
+          <a:effectRef idx="0">
+            <a:schemeClr val="accent6"/>
+          </a:effectRef>
+          <a:fontRef idx="minor">
+            <a:schemeClr val="lt1"/>
+          </a:fontRef>
+        </p:style>
+        <p:txBody>
+          <a:bodyPr wrap="none" rtlCol="0">
+            <a:spAutoFit/>
+          </a:bodyPr>
+          <a:lstStyle/>
+          <a:p>
+            <a:r>
+              <a:rPr lang="en-US" sz="4000" b="1" dirty="0">
+                <a:solidFill>
+                  <a:schemeClr val="tx1"/>
+                </a:solidFill>
+              </a:rPr>
+              <a:t>…</a:t>
+            </a:r>
+          </a:p>
+        </p:txBody>
+      </p:sp>
     </p:spTree>
     <p:extLst>
       <p:ext uri="{BB962C8B-B14F-4D97-AF65-F5344CB8AC3E}">
@@ -56133,35 +56778,26 @@
                                   </p:childTnLst>
                                 </p:cTn>
                               </p:par>
+                            </p:childTnLst>
+                          </p:cTn>
+                        </p:par>
+                      </p:childTnLst>
+                    </p:cTn>
+                  </p:par>
+                  <p:par>
+                    <p:cTn id="7" fill="hold">
+                      <p:stCondLst>
+                        <p:cond delay="indefinite"/>
+                      </p:stCondLst>
+                      <p:childTnLst>
+                        <p:par>
+                          <p:cTn id="8" fill="hold">
+                            <p:stCondLst>
+                              <p:cond delay="0"/>
+                            </p:stCondLst>
+                            <p:childTnLst>
                               <p:par>
-                                <p:cTn id="7" presetID="1" presetClass="entr" presetSubtype="0" fill="hold" grpId="0" nodeType="withEffect">
-                                  <p:stCondLst>
-                                    <p:cond delay="0"/>
-                                  </p:stCondLst>
-                                  <p:childTnLst>
-                                    <p:set>
-                                      <p:cBhvr>
-                                        <p:cTn id="8" dur="1" fill="hold">
-                                          <p:stCondLst>
-                                            <p:cond delay="0"/>
-                                          </p:stCondLst>
-                                        </p:cTn>
-                                        <p:tgtEl>
-                                          <p:spTgt spid="243"/>
-                                        </p:tgtEl>
-                                        <p:attrNameLst>
-                                          <p:attrName>style.visibility</p:attrName>
-                                        </p:attrNameLst>
-                                      </p:cBhvr>
-                                      <p:to>
-                                        <p:strVal val="visible"/>
-                                      </p:to>
-                                    </p:set>
-                                  </p:childTnLst>
-                                </p:cTn>
-                              </p:par>
-                              <p:par>
-                                <p:cTn id="9" presetID="1" presetClass="entr" presetSubtype="0" fill="hold" grpId="0" nodeType="withEffect">
+                                <p:cTn id="9" presetID="1" presetClass="entr" presetSubtype="0" fill="hold" grpId="0" nodeType="clickEffect">
                                   <p:stCondLst>
                                     <p:cond delay="0"/>
                                   </p:stCondLst>
@@ -56174,61 +56810,7 @@
                                           </p:stCondLst>
                                         </p:cTn>
                                         <p:tgtEl>
-                                          <p:spTgt spid="245"/>
-                                        </p:tgtEl>
-                                        <p:attrNameLst>
-                                          <p:attrName>style.visibility</p:attrName>
-                                        </p:attrNameLst>
-                                      </p:cBhvr>
-                                      <p:to>
-                                        <p:strVal val="visible"/>
-                                      </p:to>
-                                    </p:set>
-                                  </p:childTnLst>
-                                </p:cTn>
-                              </p:par>
-                              <p:par>
-                                <p:cTn id="11" presetID="1" presetClass="entr" presetSubtype="0" fill="hold" grpId="0" nodeType="withEffect">
-                                  <p:stCondLst>
-                                    <p:cond delay="0"/>
-                                  </p:stCondLst>
-                                  <p:childTnLst>
-                                    <p:set>
-                                      <p:cBhvr>
-                                        <p:cTn id="12" dur="1" fill="hold">
-                                          <p:stCondLst>
-                                            <p:cond delay="0"/>
-                                          </p:stCondLst>
-                                        </p:cTn>
-                                        <p:tgtEl>
-                                          <p:spTgt spid="244"/>
-                                        </p:tgtEl>
-                                        <p:attrNameLst>
-                                          <p:attrName>style.visibility</p:attrName>
-                                        </p:attrNameLst>
-                                      </p:cBhvr>
-                                      <p:to>
-                                        <p:strVal val="visible"/>
-                                      </p:to>
-                                    </p:set>
-                                  </p:childTnLst>
-                                </p:cTn>
-                              </p:par>
-                              <p:par>
-                                <p:cTn id="13" presetID="1" presetClass="entr" presetSubtype="0" fill="hold" grpId="0" nodeType="withEffect">
-                                  <p:stCondLst>
-                                    <p:cond delay="0"/>
-                                  </p:stCondLst>
-                                  <p:childTnLst>
-                                    <p:set>
-                                      <p:cBhvr>
-                                        <p:cTn id="14" dur="1" fill="hold">
-                                          <p:stCondLst>
-                                            <p:cond delay="0"/>
-                                          </p:stCondLst>
-                                        </p:cTn>
-                                        <p:tgtEl>
-                                          <p:spTgt spid="246"/>
+                                          <p:spTgt spid="256"/>
                                         </p:tgtEl>
                                         <p:attrNameLst>
                                           <p:attrName>style.visibility</p:attrName>
@@ -56248,77 +56830,32 @@
                     </p:cTn>
                   </p:par>
                   <p:par>
-                    <p:cTn id="15" fill="hold">
+                    <p:cTn id="11" fill="hold">
                       <p:stCondLst>
                         <p:cond delay="indefinite"/>
                       </p:stCondLst>
                       <p:childTnLst>
                         <p:par>
-                          <p:cTn id="16" fill="hold">
+                          <p:cTn id="12" fill="hold">
                             <p:stCondLst>
                               <p:cond delay="0"/>
                             </p:stCondLst>
                             <p:childTnLst>
                               <p:par>
-                                <p:cTn id="17" presetID="1" presetClass="entr" presetSubtype="0" fill="hold" grpId="0" nodeType="clickEffect">
+                                <p:cTn id="13" presetID="1" presetClass="entr" presetSubtype="0" fill="hold" grpId="0" nodeType="clickEffect">
                                   <p:stCondLst>
                                     <p:cond delay="0"/>
                                   </p:stCondLst>
                                   <p:childTnLst>
                                     <p:set>
                                       <p:cBhvr>
-                                        <p:cTn id="18" dur="1" fill="hold">
+                                        <p:cTn id="14" dur="1" fill="hold">
                                           <p:stCondLst>
                                             <p:cond delay="0"/>
                                           </p:stCondLst>
                                         </p:cTn>
                                         <p:tgtEl>
-                                          <p:spTgt spid="242"/>
-                                        </p:tgtEl>
-                                        <p:attrNameLst>
-                                          <p:attrName>style.visibility</p:attrName>
-                                        </p:attrNameLst>
-                                      </p:cBhvr>
-                                      <p:to>
-                                        <p:strVal val="visible"/>
-                                      </p:to>
-                                    </p:set>
-                                  </p:childTnLst>
-                                </p:cTn>
-                              </p:par>
-                            </p:childTnLst>
-                          </p:cTn>
-                        </p:par>
-                      </p:childTnLst>
-                    </p:cTn>
-                  </p:par>
-                  <p:par>
-                    <p:cTn id="19" fill="hold">
-                      <p:stCondLst>
-                        <p:cond delay="indefinite"/>
-                      </p:stCondLst>
-                      <p:childTnLst>
-                        <p:par>
-                          <p:cTn id="20" fill="hold">
-                            <p:stCondLst>
-                              <p:cond delay="0"/>
-                            </p:stCondLst>
-                            <p:childTnLst>
-                              <p:par>
-                                <p:cTn id="21" presetID="1" presetClass="entr" presetSubtype="0" fill="hold" grpId="0" nodeType="clickEffect">
-                                  <p:stCondLst>
-                                    <p:cond delay="0"/>
-                                  </p:stCondLst>
-                                  <p:childTnLst>
-                                    <p:set>
-                                      <p:cBhvr>
-                                        <p:cTn id="22" dur="1" fill="hold">
-                                          <p:stCondLst>
-                                            <p:cond delay="0"/>
-                                          </p:stCondLst>
-                                        </p:cTn>
-                                        <p:tgtEl>
-                                          <p:spTgt spid="255"/>
+                                          <p:spTgt spid="258"/>
                                         </p:tgtEl>
                                         <p:attrNameLst>
                                           <p:attrName>style.visibility</p:attrName>
@@ -56360,12 +56897,8 @@
     </p:tnLst>
     <p:bldLst>
       <p:bldP spid="68" grpId="0" animBg="1"/>
-      <p:bldP spid="242" grpId="0" animBg="1"/>
-      <p:bldP spid="243" grpId="0"/>
-      <p:bldP spid="244" grpId="0"/>
-      <p:bldP spid="245" grpId="0"/>
-      <p:bldP spid="246" grpId="0"/>
-      <p:bldP spid="255" grpId="0" animBg="1"/>
+      <p:bldP spid="256" grpId="0" animBg="1"/>
+      <p:bldP spid="258" grpId="0" animBg="1"/>
     </p:bldLst>
   </p:timing>
 </p:sld>

</xml_diff>